<commit_message>
einbisschen weiter gearbeitet an der Doku und Präsentation
</commit_message>
<xml_diff>
--- a/Ausarbeitung/Präsentation.pptx
+++ b/Ausarbeitung/Präsentation.pptx
@@ -5,16 +5,19 @@
     <p:sldMasterId id="2147483648" r:id="rId1"/>
   </p:sldMasterIdLst>
   <p:notesMasterIdLst>
-    <p:notesMasterId r:id="rId6"/>
+    <p:notesMasterId r:id="rId9"/>
   </p:notesMasterIdLst>
   <p:handoutMasterIdLst>
-    <p:handoutMasterId r:id="rId7"/>
+    <p:handoutMasterId r:id="rId10"/>
   </p:handoutMasterIdLst>
   <p:sldIdLst>
     <p:sldId id="256" r:id="rId2"/>
     <p:sldId id="257" r:id="rId3"/>
     <p:sldId id="258" r:id="rId4"/>
     <p:sldId id="259" r:id="rId5"/>
+    <p:sldId id="260" r:id="rId6"/>
+    <p:sldId id="261" r:id="rId7"/>
+    <p:sldId id="262" r:id="rId8"/>
   </p:sldIdLst>
   <p:sldSz cx="10080625" cy="7559675"/>
   <p:notesSz cx="7559675" cy="10691813"/>
@@ -113,6 +116,11 @@
       </a:defRPr>
     </a:lvl9pPr>
   </p:defaultTextStyle>
+  <p:extLst>
+    <p:ext uri="{EFAFB233-063F-42B5-8137-9DF3F51BA10A}">
+      <p15:sldGuideLst xmlns:p15="http://schemas.microsoft.com/office/powerpoint/2012/main"/>
+    </p:ext>
+  </p:extLst>
 </p:presentation>
 </file>
 
@@ -1173,6 +1181,339 @@
 </p:notes>
 </file>
 
+<file path=ppt/notesSlides/notesSlide5.xml><?xml version="1.0" encoding="utf-8"?>
+<p:notes xmlns:a="http://schemas.openxmlformats.org/drawingml/2006/main" xmlns:r="http://schemas.openxmlformats.org/officeDocument/2006/relationships" xmlns:p="http://schemas.openxmlformats.org/presentationml/2006/main">
+  <p:cSld>
+    <p:spTree>
+      <p:nvGrpSpPr>
+        <p:cNvPr id="1" name=""/>
+        <p:cNvGrpSpPr/>
+        <p:nvPr/>
+      </p:nvGrpSpPr>
+      <p:grpSpPr>
+        <a:xfrm>
+          <a:off x="0" y="0"/>
+          <a:ext cx="0" cy="0"/>
+          <a:chOff x="0" y="0"/>
+          <a:chExt cx="0" cy="0"/>
+        </a:xfrm>
+      </p:grpSpPr>
+      <p:sp>
+        <p:nvSpPr>
+          <p:cNvPr id="7" name="Foliennummernplatzhalter 6"/>
+          <p:cNvSpPr txBox="1">
+            <a:spLocks noGrp="1"/>
+          </p:cNvSpPr>
+          <p:nvPr>
+            <p:ph type="sldNum" sz="quarter" idx="5"/>
+          </p:nvPr>
+        </p:nvSpPr>
+        <p:spPr>
+          <a:ln/>
+        </p:spPr>
+        <p:txBody>
+          <a:bodyPr lIns="0" tIns="0" rIns="0" bIns="0" anchor="b">
+            <a:noAutofit/>
+          </a:bodyPr>
+          <a:lstStyle/>
+          <a:p>
+            <a:pPr lvl="0"/>
+            <a:fld id="{FF5DBC07-F90A-4106-833B-67AA97060579}" type="slidenum">
+              <a:t>5</a:t>
+            </a:fld>
+            <a:endParaRPr lang="x-none"/>
+          </a:p>
+        </p:txBody>
+      </p:sp>
+      <p:sp>
+        <p:nvSpPr>
+          <p:cNvPr id="2" name="Folienbildplatzhalter 1"/>
+          <p:cNvSpPr>
+            <a:spLocks noGrp="1" noRot="1" noChangeAspect="1" noResize="1"/>
+          </p:cNvSpPr>
+          <p:nvPr>
+            <p:ph type="sldImg"/>
+          </p:nvPr>
+        </p:nvSpPr>
+        <p:spPr>
+          <a:xfrm>
+            <a:off x="1106488" y="812800"/>
+            <a:ext cx="5345112" cy="4008438"/>
+          </a:xfrm>
+          <a:solidFill>
+            <a:schemeClr val="accent1"/>
+          </a:solidFill>
+          <a:ln w="25400">
+            <a:solidFill>
+              <a:schemeClr val="accent1">
+                <a:shade val="50000"/>
+              </a:schemeClr>
+            </a:solidFill>
+            <a:prstDash val="solid"/>
+          </a:ln>
+        </p:spPr>
+      </p:sp>
+      <p:sp>
+        <p:nvSpPr>
+          <p:cNvPr id="3" name="Notizenplatzhalter 2"/>
+          <p:cNvSpPr txBox="1">
+            <a:spLocks noGrp="1"/>
+          </p:cNvSpPr>
+          <p:nvPr>
+            <p:ph type="body" sz="quarter" idx="1"/>
+          </p:nvPr>
+        </p:nvSpPr>
+        <p:spPr>
+          <a:xfrm>
+            <a:off x="756000" y="5078520"/>
+            <a:ext cx="6047640" cy="4811400"/>
+          </a:xfrm>
+        </p:spPr>
+        <p:txBody>
+          <a:bodyPr>
+            <a:spAutoFit/>
+          </a:bodyPr>
+          <a:lstStyle/>
+          <a:p>
+            <a:endParaRPr lang="x-none"/>
+          </a:p>
+        </p:txBody>
+      </p:sp>
+    </p:spTree>
+    <p:extLst>
+      <p:ext uri="{BB962C8B-B14F-4D97-AF65-F5344CB8AC3E}">
+        <p14:creationId xmlns:p14="http://schemas.microsoft.com/office/powerpoint/2010/main" val="3678967268"/>
+      </p:ext>
+    </p:extLst>
+  </p:cSld>
+  <p:clrMapOvr>
+    <a:masterClrMapping/>
+  </p:clrMapOvr>
+</p:notes>
+</file>
+
+<file path=ppt/notesSlides/notesSlide6.xml><?xml version="1.0" encoding="utf-8"?>
+<p:notes xmlns:a="http://schemas.openxmlformats.org/drawingml/2006/main" xmlns:r="http://schemas.openxmlformats.org/officeDocument/2006/relationships" xmlns:p="http://schemas.openxmlformats.org/presentationml/2006/main">
+  <p:cSld>
+    <p:spTree>
+      <p:nvGrpSpPr>
+        <p:cNvPr id="1" name=""/>
+        <p:cNvGrpSpPr/>
+        <p:nvPr/>
+      </p:nvGrpSpPr>
+      <p:grpSpPr>
+        <a:xfrm>
+          <a:off x="0" y="0"/>
+          <a:ext cx="0" cy="0"/>
+          <a:chOff x="0" y="0"/>
+          <a:chExt cx="0" cy="0"/>
+        </a:xfrm>
+      </p:grpSpPr>
+      <p:sp>
+        <p:nvSpPr>
+          <p:cNvPr id="7" name="Foliennummernplatzhalter 6"/>
+          <p:cNvSpPr txBox="1">
+            <a:spLocks noGrp="1"/>
+          </p:cNvSpPr>
+          <p:nvPr>
+            <p:ph type="sldNum" sz="quarter" idx="5"/>
+          </p:nvPr>
+        </p:nvSpPr>
+        <p:spPr>
+          <a:ln/>
+        </p:spPr>
+        <p:txBody>
+          <a:bodyPr lIns="0" tIns="0" rIns="0" bIns="0" anchor="b">
+            <a:noAutofit/>
+          </a:bodyPr>
+          <a:lstStyle/>
+          <a:p>
+            <a:pPr lvl="0"/>
+            <a:fld id="{FF5DBC07-F90A-4106-833B-67AA97060579}" type="slidenum">
+              <a:t>6</a:t>
+            </a:fld>
+            <a:endParaRPr lang="x-none"/>
+          </a:p>
+        </p:txBody>
+      </p:sp>
+      <p:sp>
+        <p:nvSpPr>
+          <p:cNvPr id="2" name="Folienbildplatzhalter 1"/>
+          <p:cNvSpPr>
+            <a:spLocks noGrp="1" noRot="1" noChangeAspect="1" noResize="1"/>
+          </p:cNvSpPr>
+          <p:nvPr>
+            <p:ph type="sldImg"/>
+          </p:nvPr>
+        </p:nvSpPr>
+        <p:spPr>
+          <a:xfrm>
+            <a:off x="1106488" y="812800"/>
+            <a:ext cx="5345112" cy="4008438"/>
+          </a:xfrm>
+          <a:solidFill>
+            <a:schemeClr val="accent1"/>
+          </a:solidFill>
+          <a:ln w="25400">
+            <a:solidFill>
+              <a:schemeClr val="accent1">
+                <a:shade val="50000"/>
+              </a:schemeClr>
+            </a:solidFill>
+            <a:prstDash val="solid"/>
+          </a:ln>
+        </p:spPr>
+      </p:sp>
+      <p:sp>
+        <p:nvSpPr>
+          <p:cNvPr id="3" name="Notizenplatzhalter 2"/>
+          <p:cNvSpPr txBox="1">
+            <a:spLocks noGrp="1"/>
+          </p:cNvSpPr>
+          <p:nvPr>
+            <p:ph type="body" sz="quarter" idx="1"/>
+          </p:nvPr>
+        </p:nvSpPr>
+        <p:spPr>
+          <a:xfrm>
+            <a:off x="756000" y="5078520"/>
+            <a:ext cx="6047640" cy="4811400"/>
+          </a:xfrm>
+        </p:spPr>
+        <p:txBody>
+          <a:bodyPr>
+            <a:spAutoFit/>
+          </a:bodyPr>
+          <a:lstStyle/>
+          <a:p>
+            <a:endParaRPr lang="x-none"/>
+          </a:p>
+        </p:txBody>
+      </p:sp>
+    </p:spTree>
+    <p:extLst>
+      <p:ext uri="{BB962C8B-B14F-4D97-AF65-F5344CB8AC3E}">
+        <p14:creationId xmlns:p14="http://schemas.microsoft.com/office/powerpoint/2010/main" val="498248915"/>
+      </p:ext>
+    </p:extLst>
+  </p:cSld>
+  <p:clrMapOvr>
+    <a:masterClrMapping/>
+  </p:clrMapOvr>
+</p:notes>
+</file>
+
+<file path=ppt/notesSlides/notesSlide7.xml><?xml version="1.0" encoding="utf-8"?>
+<p:notes xmlns:a="http://schemas.openxmlformats.org/drawingml/2006/main" xmlns:r="http://schemas.openxmlformats.org/officeDocument/2006/relationships" xmlns:p="http://schemas.openxmlformats.org/presentationml/2006/main">
+  <p:cSld>
+    <p:spTree>
+      <p:nvGrpSpPr>
+        <p:cNvPr id="1" name=""/>
+        <p:cNvGrpSpPr/>
+        <p:nvPr/>
+      </p:nvGrpSpPr>
+      <p:grpSpPr>
+        <a:xfrm>
+          <a:off x="0" y="0"/>
+          <a:ext cx="0" cy="0"/>
+          <a:chOff x="0" y="0"/>
+          <a:chExt cx="0" cy="0"/>
+        </a:xfrm>
+      </p:grpSpPr>
+      <p:sp>
+        <p:nvSpPr>
+          <p:cNvPr id="7" name="Foliennummernplatzhalter 6"/>
+          <p:cNvSpPr txBox="1">
+            <a:spLocks noGrp="1"/>
+          </p:cNvSpPr>
+          <p:nvPr>
+            <p:ph type="sldNum" sz="quarter" idx="5"/>
+          </p:nvPr>
+        </p:nvSpPr>
+        <p:spPr>
+          <a:ln/>
+        </p:spPr>
+        <p:txBody>
+          <a:bodyPr lIns="0" tIns="0" rIns="0" bIns="0" anchor="b">
+            <a:noAutofit/>
+          </a:bodyPr>
+          <a:lstStyle/>
+          <a:p>
+            <a:pPr lvl="0"/>
+            <a:fld id="{FF5DBC07-F90A-4106-833B-67AA97060579}" type="slidenum">
+              <a:t>7</a:t>
+            </a:fld>
+            <a:endParaRPr lang="x-none"/>
+          </a:p>
+        </p:txBody>
+      </p:sp>
+      <p:sp>
+        <p:nvSpPr>
+          <p:cNvPr id="2" name="Folienbildplatzhalter 1"/>
+          <p:cNvSpPr>
+            <a:spLocks noGrp="1" noRot="1" noChangeAspect="1" noResize="1"/>
+          </p:cNvSpPr>
+          <p:nvPr>
+            <p:ph type="sldImg"/>
+          </p:nvPr>
+        </p:nvSpPr>
+        <p:spPr>
+          <a:xfrm>
+            <a:off x="1106488" y="812800"/>
+            <a:ext cx="5345112" cy="4008438"/>
+          </a:xfrm>
+          <a:solidFill>
+            <a:schemeClr val="accent1"/>
+          </a:solidFill>
+          <a:ln w="25400">
+            <a:solidFill>
+              <a:schemeClr val="accent1">
+                <a:shade val="50000"/>
+              </a:schemeClr>
+            </a:solidFill>
+            <a:prstDash val="solid"/>
+          </a:ln>
+        </p:spPr>
+      </p:sp>
+      <p:sp>
+        <p:nvSpPr>
+          <p:cNvPr id="3" name="Notizenplatzhalter 2"/>
+          <p:cNvSpPr txBox="1">
+            <a:spLocks noGrp="1"/>
+          </p:cNvSpPr>
+          <p:nvPr>
+            <p:ph type="body" sz="quarter" idx="1"/>
+          </p:nvPr>
+        </p:nvSpPr>
+        <p:spPr>
+          <a:xfrm>
+            <a:off x="756000" y="5078520"/>
+            <a:ext cx="6047640" cy="4811400"/>
+          </a:xfrm>
+        </p:spPr>
+        <p:txBody>
+          <a:bodyPr>
+            <a:spAutoFit/>
+          </a:bodyPr>
+          <a:lstStyle/>
+          <a:p>
+            <a:endParaRPr lang="x-none"/>
+          </a:p>
+        </p:txBody>
+      </p:sp>
+    </p:spTree>
+    <p:extLst>
+      <p:ext uri="{BB962C8B-B14F-4D97-AF65-F5344CB8AC3E}">
+        <p14:creationId xmlns:p14="http://schemas.microsoft.com/office/powerpoint/2010/main" val="1292733340"/>
+      </p:ext>
+    </p:extLst>
+  </p:cSld>
+  <p:clrMapOvr>
+    <a:masterClrMapping/>
+  </p:clrMapOvr>
+</p:notes>
+</file>
+
 <file path=ppt/slideLayouts/slideLayout1.xml><?xml version="1.0" encoding="utf-8"?>
 <p:sldLayout xmlns:a="http://schemas.openxmlformats.org/drawingml/2006/main" xmlns:r="http://schemas.openxmlformats.org/officeDocument/2006/relationships" xmlns:p="http://schemas.openxmlformats.org/presentationml/2006/main" type="title" preserve="1">
   <p:cSld name="Titelfolie">
@@ -1360,11 +1701,11 @@
   <p:clrMapOvr>
     <a:masterClrMapping/>
   </p:clrMapOvr>
-  <mc:AlternateContent xmlns:mc="http://schemas.openxmlformats.org/markup-compatibility/2006">
-    <mc:Choice xmlns:p14="http://schemas.microsoft.com/office/powerpoint/2010/main" Requires="p14">
+  <mc:AlternateContent xmlns:mc="http://schemas.openxmlformats.org/markup-compatibility/2006" xmlns:p14="http://schemas.microsoft.com/office/powerpoint/2010/main">
+    <mc:Choice Requires="p14">
       <p:transition spd="slow" p14:dur="2000"/>
     </mc:Choice>
-    <mc:Fallback>
+    <mc:Fallback xmlns="">
       <p:transition spd="slow"/>
     </mc:Fallback>
   </mc:AlternateContent>
@@ -1536,11 +1877,11 @@
   <p:clrMapOvr>
     <a:masterClrMapping/>
   </p:clrMapOvr>
-  <mc:AlternateContent xmlns:mc="http://schemas.openxmlformats.org/markup-compatibility/2006">
-    <mc:Choice xmlns:p14="http://schemas.microsoft.com/office/powerpoint/2010/main" Requires="p14">
+  <mc:AlternateContent xmlns:mc="http://schemas.openxmlformats.org/markup-compatibility/2006" xmlns:p14="http://schemas.microsoft.com/office/powerpoint/2010/main">
+    <mc:Choice Requires="p14">
       <p:transition spd="slow" p14:dur="2000"/>
     </mc:Choice>
-    <mc:Fallback>
+    <mc:Fallback xmlns="">
       <p:transition spd="slow"/>
     </mc:Fallback>
   </mc:AlternateContent>
@@ -1722,11 +2063,11 @@
   <p:clrMapOvr>
     <a:masterClrMapping/>
   </p:clrMapOvr>
-  <mc:AlternateContent xmlns:mc="http://schemas.openxmlformats.org/markup-compatibility/2006">
-    <mc:Choice xmlns:p14="http://schemas.microsoft.com/office/powerpoint/2010/main" Requires="p14">
+  <mc:AlternateContent xmlns:mc="http://schemas.openxmlformats.org/markup-compatibility/2006" xmlns:p14="http://schemas.microsoft.com/office/powerpoint/2010/main">
+    <mc:Choice Requires="p14">
       <p:transition spd="slow" p14:dur="2000"/>
     </mc:Choice>
-    <mc:Fallback>
+    <mc:Fallback xmlns="">
       <p:transition spd="slow"/>
     </mc:Fallback>
   </mc:AlternateContent>
@@ -1898,11 +2239,11 @@
   <p:clrMapOvr>
     <a:masterClrMapping/>
   </p:clrMapOvr>
-  <mc:AlternateContent xmlns:mc="http://schemas.openxmlformats.org/markup-compatibility/2006">
-    <mc:Choice xmlns:p14="http://schemas.microsoft.com/office/powerpoint/2010/main" Requires="p14">
+  <mc:AlternateContent xmlns:mc="http://schemas.openxmlformats.org/markup-compatibility/2006" xmlns:p14="http://schemas.microsoft.com/office/powerpoint/2010/main">
+    <mc:Choice Requires="p14">
       <p:transition spd="slow" p14:dur="2000"/>
     </mc:Choice>
-    <mc:Fallback>
+    <mc:Fallback xmlns="">
       <p:transition spd="slow"/>
     </mc:Fallback>
   </mc:AlternateContent>
@@ -2150,11 +2491,11 @@
   <p:clrMapOvr>
     <a:masterClrMapping/>
   </p:clrMapOvr>
-  <mc:AlternateContent xmlns:mc="http://schemas.openxmlformats.org/markup-compatibility/2006">
-    <mc:Choice xmlns:p14="http://schemas.microsoft.com/office/powerpoint/2010/main" Requires="p14">
+  <mc:AlternateContent xmlns:mc="http://schemas.openxmlformats.org/markup-compatibility/2006" xmlns:p14="http://schemas.microsoft.com/office/powerpoint/2010/main">
+    <mc:Choice Requires="p14">
       <p:transition spd="slow" p14:dur="2000"/>
     </mc:Choice>
-    <mc:Fallback>
+    <mc:Fallback xmlns="">
       <p:transition spd="slow"/>
     </mc:Fallback>
   </mc:AlternateContent>
@@ -2388,11 +2729,11 @@
   <p:clrMapOvr>
     <a:masterClrMapping/>
   </p:clrMapOvr>
-  <mc:AlternateContent xmlns:mc="http://schemas.openxmlformats.org/markup-compatibility/2006">
-    <mc:Choice xmlns:p14="http://schemas.microsoft.com/office/powerpoint/2010/main" Requires="p14">
+  <mc:AlternateContent xmlns:mc="http://schemas.openxmlformats.org/markup-compatibility/2006" xmlns:p14="http://schemas.microsoft.com/office/powerpoint/2010/main">
+    <mc:Choice Requires="p14">
       <p:transition spd="slow" p14:dur="2000"/>
     </mc:Choice>
-    <mc:Fallback>
+    <mc:Fallback xmlns="">
       <p:transition spd="slow"/>
     </mc:Fallback>
   </mc:AlternateContent>
@@ -2761,11 +3102,11 @@
   <p:clrMapOvr>
     <a:masterClrMapping/>
   </p:clrMapOvr>
-  <mc:AlternateContent xmlns:mc="http://schemas.openxmlformats.org/markup-compatibility/2006">
-    <mc:Choice xmlns:p14="http://schemas.microsoft.com/office/powerpoint/2010/main" Requires="p14">
+  <mc:AlternateContent xmlns:mc="http://schemas.openxmlformats.org/markup-compatibility/2006" xmlns:p14="http://schemas.microsoft.com/office/powerpoint/2010/main">
+    <mc:Choice Requires="p14">
       <p:transition spd="slow" p14:dur="2000"/>
     </mc:Choice>
-    <mc:Fallback>
+    <mc:Fallback xmlns="">
       <p:transition spd="slow"/>
     </mc:Fallback>
   </mc:AlternateContent>
@@ -2885,11 +3226,11 @@
   <p:clrMapOvr>
     <a:masterClrMapping/>
   </p:clrMapOvr>
-  <mc:AlternateContent xmlns:mc="http://schemas.openxmlformats.org/markup-compatibility/2006">
-    <mc:Choice xmlns:p14="http://schemas.microsoft.com/office/powerpoint/2010/main" Requires="p14">
+  <mc:AlternateContent xmlns:mc="http://schemas.openxmlformats.org/markup-compatibility/2006" xmlns:p14="http://schemas.microsoft.com/office/powerpoint/2010/main">
+    <mc:Choice Requires="p14">
       <p:transition spd="slow" p14:dur="2000"/>
     </mc:Choice>
-    <mc:Fallback>
+    <mc:Fallback xmlns="">
       <p:transition spd="slow"/>
     </mc:Fallback>
   </mc:AlternateContent>
@@ -2986,11 +3327,11 @@
   <p:clrMapOvr>
     <a:masterClrMapping/>
   </p:clrMapOvr>
-  <mc:AlternateContent xmlns:mc="http://schemas.openxmlformats.org/markup-compatibility/2006">
-    <mc:Choice xmlns:p14="http://schemas.microsoft.com/office/powerpoint/2010/main" Requires="p14">
+  <mc:AlternateContent xmlns:mc="http://schemas.openxmlformats.org/markup-compatibility/2006" xmlns:p14="http://schemas.microsoft.com/office/powerpoint/2010/main">
+    <mc:Choice Requires="p14">
       <p:transition spd="slow" p14:dur="2000"/>
     </mc:Choice>
-    <mc:Fallback>
+    <mc:Fallback xmlns="">
       <p:transition spd="slow"/>
     </mc:Fallback>
   </mc:AlternateContent>
@@ -3270,11 +3611,11 @@
   <p:clrMapOvr>
     <a:masterClrMapping/>
   </p:clrMapOvr>
-  <mc:AlternateContent xmlns:mc="http://schemas.openxmlformats.org/markup-compatibility/2006">
-    <mc:Choice xmlns:p14="http://schemas.microsoft.com/office/powerpoint/2010/main" Requires="p14">
+  <mc:AlternateContent xmlns:mc="http://schemas.openxmlformats.org/markup-compatibility/2006" xmlns:p14="http://schemas.microsoft.com/office/powerpoint/2010/main">
+    <mc:Choice Requires="p14">
       <p:transition spd="slow" p14:dur="2000"/>
     </mc:Choice>
-    <mc:Fallback>
+    <mc:Fallback xmlns="">
       <p:transition spd="slow"/>
     </mc:Fallback>
   </mc:AlternateContent>
@@ -3529,11 +3870,11 @@
   <p:clrMapOvr>
     <a:masterClrMapping/>
   </p:clrMapOvr>
-  <mc:AlternateContent xmlns:mc="http://schemas.openxmlformats.org/markup-compatibility/2006">
-    <mc:Choice xmlns:p14="http://schemas.microsoft.com/office/powerpoint/2010/main" Requires="p14">
+  <mc:AlternateContent xmlns:mc="http://schemas.openxmlformats.org/markup-compatibility/2006" xmlns:p14="http://schemas.microsoft.com/office/powerpoint/2010/main">
+    <mc:Choice Requires="p14">
       <p:transition spd="slow" p14:dur="2000"/>
     </mc:Choice>
-    <mc:Fallback>
+    <mc:Fallback xmlns="">
       <p:transition spd="slow"/>
     </mc:Fallback>
   </mc:AlternateContent>
@@ -3809,11 +4150,11 @@
     <p:sldLayoutId id="2147483658" r:id="rId10"/>
     <p:sldLayoutId id="2147483659" r:id="rId11"/>
   </p:sldLayoutIdLst>
-  <mc:AlternateContent xmlns:mc="http://schemas.openxmlformats.org/markup-compatibility/2006">
-    <mc:Choice xmlns:p14="http://schemas.microsoft.com/office/powerpoint/2010/main" Requires="p14">
+  <mc:AlternateContent xmlns:mc="http://schemas.openxmlformats.org/markup-compatibility/2006" xmlns:p14="http://schemas.microsoft.com/office/powerpoint/2010/main">
+    <mc:Choice Requires="p14">
       <p:transition spd="slow" p14:dur="2000"/>
     </mc:Choice>
-    <mc:Fallback>
+    <mc:Fallback xmlns="">
       <p:transition spd="slow"/>
     </mc:Fallback>
   </mc:AlternateContent>
@@ -4155,7 +4496,7 @@
           <a:p>
             <a:pPr lvl="0"/>
             <a:fld id="{73EB4CEC-1371-4CB6-8F44-5A689661CE91}" type="datetimeFigureOut">
-              <a:t>02.11.2015</a:t>
+              <a:t>04.11.2015</a:t>
             </a:fld>
             <a:endParaRPr lang="x-none"/>
           </a:p>
@@ -4465,11 +4806,11 @@
   <p:clrMapOvr>
     <a:masterClrMapping/>
   </p:clrMapOvr>
-  <mc:AlternateContent xmlns:mc="http://schemas.openxmlformats.org/markup-compatibility/2006">
-    <mc:Choice xmlns:p14="http://schemas.microsoft.com/office/powerpoint/2010/main" Requires="p14">
+  <mc:AlternateContent xmlns:mc="http://schemas.openxmlformats.org/markup-compatibility/2006" xmlns:p14="http://schemas.microsoft.com/office/powerpoint/2010/main">
+    <mc:Choice Requires="p14">
       <p:transition spd="slow" p14:dur="2000"/>
     </mc:Choice>
-    <mc:Fallback>
+    <mc:Fallback xmlns="">
       <p:transition spd="slow"/>
     </mc:Fallback>
   </mc:AlternateContent>
@@ -4547,7 +4888,7 @@
           <a:p>
             <a:pPr lvl="0"/>
             <a:fld id="{73EB4CEC-1371-4CB6-8F44-5A689661CE91}" type="datetimeFigureOut">
-              <a:t>02.11.2015</a:t>
+              <a:t>04.11.2015</a:t>
             </a:fld>
             <a:endParaRPr lang="x-none"/>
           </a:p>
@@ -4753,6 +5094,293 @@
           </a:p>
         </p:txBody>
       </p:sp>
+      <p:sp>
+        <p:nvSpPr>
+          <p:cNvPr id="2" name="Textfeld 1"/>
+          <p:cNvSpPr txBox="1"/>
+          <p:nvPr/>
+        </p:nvSpPr>
+        <p:spPr>
+          <a:xfrm>
+            <a:off x="1207378" y="1503110"/>
+            <a:ext cx="7674964" cy="523220"/>
+          </a:xfrm>
+          <a:prstGeom prst="rect">
+            <a:avLst/>
+          </a:prstGeom>
+          <a:noFill/>
+        </p:spPr>
+        <p:txBody>
+          <a:bodyPr wrap="square" rtlCol="0">
+            <a:spAutoFit/>
+          </a:bodyPr>
+          <a:lstStyle/>
+          <a:p>
+            <a:pPr algn="ctr"/>
+            <a:r>
+              <a:rPr lang="de-DE" sz="2800" dirty="0" smtClean="0"/>
+              <a:t>Was ist ein Round-Robin-Scheduler:</a:t>
+            </a:r>
+            <a:endParaRPr lang="de-DE" sz="2800" dirty="0"/>
+          </a:p>
+        </p:txBody>
+      </p:sp>
+      <p:sp>
+        <p:nvSpPr>
+          <p:cNvPr id="6" name="Flussdiagramm: Datenträger mit direktem Zugriff 5"/>
+          <p:cNvSpPr/>
+          <p:nvPr/>
+        </p:nvSpPr>
+        <p:spPr>
+          <a:xfrm>
+            <a:off x="3689729" y="4974149"/>
+            <a:ext cx="1608096" cy="686575"/>
+          </a:xfrm>
+          <a:prstGeom prst="flowChartMagneticDrum">
+            <a:avLst/>
+          </a:prstGeom>
+        </p:spPr>
+        <p:style>
+          <a:lnRef idx="2">
+            <a:schemeClr val="accent1">
+              <a:shade val="50000"/>
+            </a:schemeClr>
+          </a:lnRef>
+          <a:fillRef idx="1">
+            <a:schemeClr val="accent1"/>
+          </a:fillRef>
+          <a:effectRef idx="0">
+            <a:schemeClr val="accent1"/>
+          </a:effectRef>
+          <a:fontRef idx="minor">
+            <a:schemeClr val="lt1"/>
+          </a:fontRef>
+        </p:style>
+        <p:txBody>
+          <a:bodyPr rtlCol="0" anchor="ctr"/>
+          <a:lstStyle/>
+          <a:p>
+            <a:pPr algn="ctr"/>
+            <a:endParaRPr lang="de-DE"/>
+          </a:p>
+        </p:txBody>
+      </p:sp>
+      <p:cxnSp>
+        <p:nvCxnSpPr>
+          <p:cNvPr id="12" name="Gewinkelte Verbindung 11"/>
+          <p:cNvCxnSpPr>
+            <a:stCxn id="6" idx="1"/>
+          </p:cNvCxnSpPr>
+          <p:nvPr/>
+        </p:nvCxnSpPr>
+        <p:spPr>
+          <a:xfrm rot="10800000" flipV="1">
+            <a:off x="2505507" y="5317437"/>
+            <a:ext cx="1184223" cy="567456"/>
+          </a:xfrm>
+          <a:prstGeom prst="bentConnector3">
+            <a:avLst/>
+          </a:prstGeom>
+          <a:ln w="38100">
+            <a:tailEnd type="triangle"/>
+          </a:ln>
+        </p:spPr>
+        <p:style>
+          <a:lnRef idx="1">
+            <a:schemeClr val="accent1"/>
+          </a:lnRef>
+          <a:fillRef idx="0">
+            <a:schemeClr val="accent1"/>
+          </a:fillRef>
+          <a:effectRef idx="0">
+            <a:schemeClr val="accent1"/>
+          </a:effectRef>
+          <a:fontRef idx="minor">
+            <a:schemeClr val="tx1"/>
+          </a:fontRef>
+        </p:style>
+      </p:cxnSp>
+      <p:cxnSp>
+        <p:nvCxnSpPr>
+          <p:cNvPr id="14" name="Gewinkelte Verbindung 13"/>
+          <p:cNvCxnSpPr>
+            <a:stCxn id="6" idx="4"/>
+          </p:cNvCxnSpPr>
+          <p:nvPr/>
+        </p:nvCxnSpPr>
+        <p:spPr>
+          <a:xfrm>
+            <a:off x="5297825" y="5317437"/>
+            <a:ext cx="1236019" cy="567456"/>
+          </a:xfrm>
+          <a:prstGeom prst="bentConnector3">
+            <a:avLst/>
+          </a:prstGeom>
+          <a:ln w="38100">
+            <a:headEnd type="triangle" w="med" len="med"/>
+            <a:tailEnd type="none" w="med" len="med"/>
+          </a:ln>
+        </p:spPr>
+        <p:style>
+          <a:lnRef idx="1">
+            <a:schemeClr val="accent1"/>
+          </a:lnRef>
+          <a:fillRef idx="0">
+            <a:schemeClr val="accent1"/>
+          </a:fillRef>
+          <a:effectRef idx="0">
+            <a:schemeClr val="accent1"/>
+          </a:effectRef>
+          <a:fontRef idx="minor">
+            <a:schemeClr val="tx1"/>
+          </a:fontRef>
+        </p:style>
+      </p:cxnSp>
+      <p:sp>
+        <p:nvSpPr>
+          <p:cNvPr id="17" name="Textfeld 16"/>
+          <p:cNvSpPr txBox="1"/>
+          <p:nvPr/>
+        </p:nvSpPr>
+        <p:spPr>
+          <a:xfrm>
+            <a:off x="2355227" y="5954501"/>
+            <a:ext cx="1439056" cy="369332"/>
+          </a:xfrm>
+          <a:prstGeom prst="rect">
+            <a:avLst/>
+          </a:prstGeom>
+          <a:noFill/>
+        </p:spPr>
+        <p:txBody>
+          <a:bodyPr wrap="square" rtlCol="0">
+            <a:spAutoFit/>
+          </a:bodyPr>
+          <a:lstStyle/>
+          <a:p>
+            <a:r>
+              <a:rPr lang="de-DE" dirty="0" err="1" smtClean="0"/>
+              <a:t>deQueue</a:t>
+            </a:r>
+            <a:r>
+              <a:rPr lang="de-DE" dirty="0" smtClean="0"/>
+              <a:t>()</a:t>
+            </a:r>
+            <a:endParaRPr lang="de-DE" dirty="0"/>
+          </a:p>
+        </p:txBody>
+      </p:sp>
+      <p:sp>
+        <p:nvSpPr>
+          <p:cNvPr id="18" name="Textfeld 17"/>
+          <p:cNvSpPr txBox="1"/>
+          <p:nvPr/>
+        </p:nvSpPr>
+        <p:spPr>
+          <a:xfrm>
+            <a:off x="5090822" y="5956478"/>
+            <a:ext cx="2293496" cy="369332"/>
+          </a:xfrm>
+          <a:prstGeom prst="rect">
+            <a:avLst/>
+          </a:prstGeom>
+          <a:noFill/>
+        </p:spPr>
+        <p:txBody>
+          <a:bodyPr wrap="square" rtlCol="0">
+            <a:spAutoFit/>
+          </a:bodyPr>
+          <a:lstStyle/>
+          <a:p>
+            <a:r>
+              <a:rPr lang="de-DE" dirty="0" err="1" smtClean="0"/>
+              <a:t>enQueue</a:t>
+            </a:r>
+            <a:r>
+              <a:rPr lang="de-DE" dirty="0" smtClean="0"/>
+              <a:t>(</a:t>
+            </a:r>
+            <a:r>
+              <a:rPr lang="de-DE" dirty="0" err="1" smtClean="0"/>
+              <a:t>pcb</a:t>
+            </a:r>
+            <a:r>
+              <a:rPr lang="de-DE" dirty="0" smtClean="0"/>
+              <a:t>: </a:t>
+            </a:r>
+            <a:r>
+              <a:rPr lang="de-DE" dirty="0" err="1" smtClean="0"/>
+              <a:t>PCB_t</a:t>
+            </a:r>
+            <a:r>
+              <a:rPr lang="de-DE" dirty="0" smtClean="0"/>
+              <a:t>);</a:t>
+            </a:r>
+            <a:endParaRPr lang="de-DE" dirty="0"/>
+          </a:p>
+        </p:txBody>
+      </p:sp>
+      <p:sp>
+        <p:nvSpPr>
+          <p:cNvPr id="22" name="Textfeld 21"/>
+          <p:cNvSpPr txBox="1"/>
+          <p:nvPr/>
+        </p:nvSpPr>
+        <p:spPr>
+          <a:xfrm>
+            <a:off x="1207378" y="2900075"/>
+            <a:ext cx="7876661" cy="1200329"/>
+          </a:xfrm>
+          <a:prstGeom prst="rect">
+            <a:avLst/>
+          </a:prstGeom>
+          <a:noFill/>
+        </p:spPr>
+        <p:txBody>
+          <a:bodyPr wrap="square" rtlCol="0">
+            <a:spAutoFit/>
+          </a:bodyPr>
+          <a:lstStyle/>
+          <a:p>
+            <a:pPr marL="285750" indent="-285750">
+              <a:buFontTx/>
+              <a:buChar char="-"/>
+            </a:pPr>
+            <a:r>
+              <a:rPr lang="de-DE" dirty="0" smtClean="0"/>
+              <a:t>Der Round-Robin-Scheduler (RRS) wird eingesetzt um Prozesse zu verwalten.</a:t>
+            </a:r>
+          </a:p>
+          <a:p>
+            <a:pPr marL="285750" indent="-285750">
+              <a:buFontTx/>
+              <a:buChar char="-"/>
+            </a:pPr>
+            <a:endParaRPr lang="de-DE" dirty="0"/>
+          </a:p>
+          <a:p>
+            <a:pPr marL="285750" indent="-285750">
+              <a:buFontTx/>
+              <a:buChar char="-"/>
+            </a:pPr>
+            <a:endParaRPr lang="de-DE" dirty="0"/>
+          </a:p>
+          <a:p>
+            <a:pPr marL="285750" indent="-285750">
+              <a:buFontTx/>
+              <a:buChar char="-"/>
+            </a:pPr>
+            <a:r>
+              <a:rPr lang="de-DE" dirty="0"/>
+              <a:t>Der RRS wird mittels einer Warteschlange </a:t>
+            </a:r>
+            <a:r>
+              <a:rPr lang="de-DE" dirty="0" smtClean="0"/>
+              <a:t>implementiert.</a:t>
+            </a:r>
+          </a:p>
+        </p:txBody>
+      </p:sp>
     </p:spTree>
     <p:extLst>
       <p:ext uri="{BB962C8B-B14F-4D97-AF65-F5344CB8AC3E}">
@@ -4763,11 +5391,11 @@
   <p:clrMapOvr>
     <a:masterClrMapping/>
   </p:clrMapOvr>
-  <mc:AlternateContent xmlns:mc="http://schemas.openxmlformats.org/markup-compatibility/2006">
-    <mc:Choice xmlns:p14="http://schemas.microsoft.com/office/powerpoint/2010/main" Requires="p14">
+  <mc:AlternateContent xmlns:mc="http://schemas.openxmlformats.org/markup-compatibility/2006" xmlns:p14="http://schemas.microsoft.com/office/powerpoint/2010/main">
+    <mc:Choice Requires="p14">
       <p:transition spd="slow" p14:dur="2000"/>
     </mc:Choice>
-    <mc:Fallback>
+    <mc:Fallback xmlns="">
       <p:transition spd="slow"/>
     </mc:Fallback>
   </mc:AlternateContent>
@@ -4845,7 +5473,7 @@
           <a:p>
             <a:pPr lvl="0"/>
             <a:fld id="{73EB4CEC-1371-4CB6-8F44-5A689661CE91}" type="datetimeFigureOut">
-              <a:t>02.11.2015</a:t>
+              <a:t>04.11.2015</a:t>
             </a:fld>
             <a:endParaRPr lang="x-none"/>
           </a:p>
@@ -5051,6 +5679,67 @@
           </a:p>
         </p:txBody>
       </p:sp>
+      <p:pic>
+        <p:nvPicPr>
+          <p:cNvPr id="2" name="Grafik 1"/>
+          <p:cNvPicPr>
+            <a:picLocks noChangeAspect="1"/>
+          </p:cNvPicPr>
+          <p:nvPr/>
+        </p:nvPicPr>
+        <p:blipFill>
+          <a:blip r:embed="rId4">
+            <a:extLst>
+              <a:ext uri="{28A0092B-C50C-407E-A947-70E740481C1C}">
+                <a14:useLocalDpi xmlns:a14="http://schemas.microsoft.com/office/drawing/2010/main" val="0"/>
+              </a:ext>
+            </a:extLst>
+          </a:blip>
+          <a:stretch>
+            <a:fillRect/>
+          </a:stretch>
+        </p:blipFill>
+        <p:spPr>
+          <a:xfrm>
+            <a:off x="344040" y="2828415"/>
+            <a:ext cx="9401640" cy="3227611"/>
+          </a:xfrm>
+          <a:prstGeom prst="rect">
+            <a:avLst/>
+          </a:prstGeom>
+        </p:spPr>
+      </p:pic>
+      <p:sp>
+        <p:nvSpPr>
+          <p:cNvPr id="6" name="Textfeld 5"/>
+          <p:cNvSpPr txBox="1"/>
+          <p:nvPr/>
+        </p:nvSpPr>
+        <p:spPr>
+          <a:xfrm>
+            <a:off x="990021" y="1764720"/>
+            <a:ext cx="8109678" cy="584775"/>
+          </a:xfrm>
+          <a:prstGeom prst="rect">
+            <a:avLst/>
+          </a:prstGeom>
+          <a:noFill/>
+        </p:spPr>
+        <p:txBody>
+          <a:bodyPr wrap="square" rtlCol="0">
+            <a:spAutoFit/>
+          </a:bodyPr>
+          <a:lstStyle/>
+          <a:p>
+            <a:pPr algn="ctr"/>
+            <a:r>
+              <a:rPr lang="de-DE" sz="3200" dirty="0" smtClean="0"/>
+              <a:t>Klassendiagramm unseren RRS:</a:t>
+            </a:r>
+            <a:endParaRPr lang="de-DE" sz="3200" dirty="0"/>
+          </a:p>
+        </p:txBody>
+      </p:sp>
     </p:spTree>
     <p:extLst>
       <p:ext uri="{BB962C8B-B14F-4D97-AF65-F5344CB8AC3E}">
@@ -5061,11 +5750,11 @@
   <p:clrMapOvr>
     <a:masterClrMapping/>
   </p:clrMapOvr>
-  <mc:AlternateContent xmlns:mc="http://schemas.openxmlformats.org/markup-compatibility/2006">
-    <mc:Choice xmlns:p14="http://schemas.microsoft.com/office/powerpoint/2010/main" Requires="p14">
+  <mc:AlternateContent xmlns:mc="http://schemas.openxmlformats.org/markup-compatibility/2006" xmlns:p14="http://schemas.microsoft.com/office/powerpoint/2010/main">
+    <mc:Choice Requires="p14">
       <p:transition spd="slow" p14:dur="2000"/>
     </mc:Choice>
-    <mc:Fallback>
+    <mc:Fallback xmlns="">
       <p:transition spd="slow"/>
     </mc:Fallback>
   </mc:AlternateContent>
@@ -5143,7 +5832,7 @@
           <a:p>
             <a:pPr lvl="0"/>
             <a:fld id="{73EB4CEC-1371-4CB6-8F44-5A689661CE91}" type="datetimeFigureOut">
-              <a:t>02.11.2015</a:t>
+              <a:t>04.11.2015</a:t>
             </a:fld>
             <a:endParaRPr lang="x-none"/>
           </a:p>
@@ -5353,6 +6042,930 @@
     <p:extLst>
       <p:ext uri="{BB962C8B-B14F-4D97-AF65-F5344CB8AC3E}">
         <p14:creationId xmlns:p14="http://schemas.microsoft.com/office/powerpoint/2010/main" val="186064819"/>
+      </p:ext>
+    </p:extLst>
+  </p:cSld>
+  <p:clrMapOvr>
+    <a:masterClrMapping/>
+  </p:clrMapOvr>
+  <mc:AlternateContent xmlns:mc="http://schemas.openxmlformats.org/markup-compatibility/2006" xmlns:p14="http://schemas.microsoft.com/office/powerpoint/2010/main">
+    <mc:Choice Requires="p14">
+      <p:transition spd="slow" p14:dur="2000"/>
+    </mc:Choice>
+    <mc:Fallback xmlns="">
+      <p:transition spd="slow"/>
+    </mc:Fallback>
+  </mc:AlternateContent>
+  <p:timing>
+    <p:tnLst>
+      <p:par>
+        <p:cTn id="1" dur="indefinite" restart="never" nodeType="tmRoot"/>
+      </p:par>
+    </p:tnLst>
+  </p:timing>
+</p:sld>
+</file>
+
+<file path=ppt/slides/slide5.xml><?xml version="1.0" encoding="utf-8"?>
+<p:sld xmlns:a="http://schemas.openxmlformats.org/drawingml/2006/main" xmlns:r="http://schemas.openxmlformats.org/officeDocument/2006/relationships" xmlns:p="http://schemas.openxmlformats.org/presentationml/2006/main">
+  <p:cSld>
+    <p:spTree>
+      <p:nvGrpSpPr>
+        <p:cNvPr id="1" name=""/>
+        <p:cNvGrpSpPr/>
+        <p:nvPr/>
+      </p:nvGrpSpPr>
+      <p:grpSpPr>
+        <a:xfrm>
+          <a:off x="0" y="0"/>
+          <a:ext cx="0" cy="0"/>
+          <a:chOff x="0" y="0"/>
+          <a:chExt cx="0" cy="0"/>
+        </a:xfrm>
+      </p:grpSpPr>
+      <p:pic>
+        <p:nvPicPr>
+          <p:cNvPr id="10" name="Grafik 9"/>
+          <p:cNvPicPr>
+            <a:picLocks noChangeAspect="1"/>
+          </p:cNvPicPr>
+          <p:nvPr/>
+        </p:nvPicPr>
+        <p:blipFill>
+          <a:blip r:embed="rId3">
+            <a:extLst>
+              <a:ext uri="{28A0092B-C50C-407E-A947-70E740481C1C}">
+                <a14:useLocalDpi xmlns:a14="http://schemas.microsoft.com/office/drawing/2010/main" val="0"/>
+              </a:ext>
+            </a:extLst>
+          </a:blip>
+          <a:stretch>
+            <a:fillRect/>
+          </a:stretch>
+        </p:blipFill>
+        <p:spPr>
+          <a:xfrm>
+            <a:off x="7510072" y="72000"/>
+            <a:ext cx="2391615" cy="1214789"/>
+          </a:xfrm>
+          <a:prstGeom prst="rect">
+            <a:avLst/>
+          </a:prstGeom>
+        </p:spPr>
+      </p:pic>
+      <p:sp>
+        <p:nvSpPr>
+          <p:cNvPr id="7" name="Datumsplatzhalter 1"/>
+          <p:cNvSpPr>
+            <a:spLocks noGrp="1"/>
+          </p:cNvSpPr>
+          <p:nvPr>
+            <p:ph type="dt" sz="half" idx="10"/>
+          </p:nvPr>
+        </p:nvSpPr>
+        <p:spPr/>
+        <p:txBody>
+          <a:bodyPr/>
+          <a:lstStyle/>
+          <a:p>
+            <a:pPr lvl="0"/>
+            <a:fld id="{73EB4CEC-1371-4CB6-8F44-5A689661CE91}" type="datetimeFigureOut">
+              <a:t>04.11.2015</a:t>
+            </a:fld>
+            <a:endParaRPr lang="x-none"/>
+          </a:p>
+        </p:txBody>
+      </p:sp>
+      <p:sp>
+        <p:nvSpPr>
+          <p:cNvPr id="8" name="Fußzeilenplatzhalter 2"/>
+          <p:cNvSpPr>
+            <a:spLocks noGrp="1"/>
+          </p:cNvSpPr>
+          <p:nvPr>
+            <p:ph type="ftr" sz="quarter" idx="11"/>
+          </p:nvPr>
+        </p:nvSpPr>
+        <p:spPr/>
+        <p:txBody>
+          <a:bodyPr/>
+          <a:lstStyle/>
+          <a:p>
+            <a:pPr lvl="0"/>
+            <a:r>
+              <a:rPr lang="x-none" smtClean="0"/>
+              <a:t>Kai Köster und Erik Svenonius</a:t>
+            </a:r>
+            <a:endParaRPr lang="x-none"/>
+          </a:p>
+        </p:txBody>
+      </p:sp>
+      <p:sp>
+        <p:nvSpPr>
+          <p:cNvPr id="9" name="Foliennummernplatzhalter 3"/>
+          <p:cNvSpPr>
+            <a:spLocks noGrp="1"/>
+          </p:cNvSpPr>
+          <p:nvPr>
+            <p:ph type="sldNum" sz="quarter" idx="12"/>
+          </p:nvPr>
+        </p:nvSpPr>
+        <p:spPr/>
+        <p:txBody>
+          <a:bodyPr/>
+          <a:lstStyle/>
+          <a:p>
+            <a:pPr lvl="0"/>
+            <a:fld id="{74D86CA0-BD5C-4A7E-8D6D-C071106A5058}" type="slidenum">
+              <a:t>5</a:t>
+            </a:fld>
+            <a:endParaRPr lang="x-none"/>
+          </a:p>
+        </p:txBody>
+      </p:sp>
+      <p:sp>
+        <p:nvSpPr>
+          <p:cNvPr id="3" name="Gerader Verbinder 2"/>
+          <p:cNvSpPr/>
+          <p:nvPr/>
+        </p:nvSpPr>
+        <p:spPr>
+          <a:xfrm>
+            <a:off x="-180000" y="1044000"/>
+            <a:ext cx="10800000" cy="0"/>
+          </a:xfrm>
+          <a:prstGeom prst="line">
+            <a:avLst/>
+          </a:prstGeom>
+          <a:noFill/>
+          <a:ln w="0">
+            <a:solidFill>
+              <a:srgbClr val="000000"/>
+            </a:solidFill>
+            <a:prstDash val="solid"/>
+          </a:ln>
+        </p:spPr>
+        <p:txBody>
+          <a:bodyPr vert="horz" wrap="none" lIns="90000" tIns="45000" rIns="90000" bIns="45000" anchor="ctr" anchorCtr="1" compatLnSpc="0"/>
+          <a:lstStyle/>
+          <a:p>
+            <a:pPr marL="0" marR="0" lvl="0" indent="0" rtl="0" hangingPunct="0">
+              <a:lnSpc>
+                <a:spcPct val="100000"/>
+              </a:lnSpc>
+              <a:spcBef>
+                <a:spcPts val="0"/>
+              </a:spcBef>
+              <a:spcAft>
+                <a:spcPts val="0"/>
+              </a:spcAft>
+              <a:buNone/>
+              <a:tabLst/>
+            </a:pPr>
+            <a:endParaRPr lang="de-DE" sz="1800" b="0" i="0" u="none" strike="noStrike" kern="1200">
+              <a:ln>
+                <a:noFill/>
+              </a:ln>
+              <a:latin typeface="Arial" pitchFamily="18"/>
+              <a:ea typeface="Andale Sans UI" pitchFamily="2"/>
+              <a:cs typeface="Tahoma" pitchFamily="2"/>
+            </a:endParaRPr>
+          </a:p>
+        </p:txBody>
+      </p:sp>
+      <p:sp>
+        <p:nvSpPr>
+          <p:cNvPr id="4" name="Textfeld 3"/>
+          <p:cNvSpPr txBox="1"/>
+          <p:nvPr/>
+        </p:nvSpPr>
+        <p:spPr>
+          <a:xfrm>
+            <a:off x="469440" y="360000"/>
+            <a:ext cx="2230560" cy="432720"/>
+          </a:xfrm>
+          <a:prstGeom prst="rect">
+            <a:avLst/>
+          </a:prstGeom>
+          <a:noFill/>
+          <a:ln>
+            <a:noFill/>
+          </a:ln>
+        </p:spPr>
+        <p:txBody>
+          <a:bodyPr vert="horz" wrap="none" lIns="90000" tIns="45000" rIns="90000" bIns="45000" compatLnSpc="0">
+            <a:spAutoFit/>
+          </a:bodyPr>
+          <a:lstStyle/>
+          <a:p>
+            <a:pPr marL="0" marR="0" lvl="0" indent="0" rtl="0" hangingPunct="0">
+              <a:lnSpc>
+                <a:spcPct val="100000"/>
+              </a:lnSpc>
+              <a:spcBef>
+                <a:spcPts val="0"/>
+              </a:spcBef>
+              <a:spcAft>
+                <a:spcPts val="0"/>
+              </a:spcAft>
+              <a:buNone/>
+              <a:tabLst/>
+              <a:defRPr sz="1800"/>
+            </a:pPr>
+            <a:r>
+              <a:rPr lang="de-DE" sz="1800" b="0" i="0" u="none" strike="noStrike" kern="1200">
+                <a:ln>
+                  <a:noFill/>
+                </a:ln>
+                <a:latin typeface="Arial" pitchFamily="18"/>
+                <a:ea typeface="Andale Sans UI" pitchFamily="2"/>
+                <a:cs typeface="Tahoma" pitchFamily="2"/>
+              </a:rPr>
+              <a:t>Softwareverifikation</a:t>
+            </a:r>
+          </a:p>
+        </p:txBody>
+      </p:sp>
+      <p:sp>
+        <p:nvSpPr>
+          <p:cNvPr id="5" name="Gerader Verbinder 4"/>
+          <p:cNvSpPr/>
+          <p:nvPr/>
+        </p:nvSpPr>
+        <p:spPr>
+          <a:xfrm>
+            <a:off x="360000" y="72000"/>
+            <a:ext cx="0" cy="900000"/>
+          </a:xfrm>
+          <a:prstGeom prst="line">
+            <a:avLst/>
+          </a:prstGeom>
+          <a:noFill/>
+          <a:ln w="180000">
+            <a:solidFill>
+              <a:srgbClr val="FF3333"/>
+            </a:solidFill>
+            <a:prstDash val="solid"/>
+          </a:ln>
+        </p:spPr>
+        <p:txBody>
+          <a:bodyPr vert="horz" wrap="none" lIns="180000" tIns="135000" rIns="180000" bIns="135000" anchor="ctr" anchorCtr="1" compatLnSpc="0"/>
+          <a:lstStyle/>
+          <a:p>
+            <a:pPr marL="0" marR="0" lvl="0" indent="0" rtl="0" hangingPunct="0">
+              <a:lnSpc>
+                <a:spcPct val="100000"/>
+              </a:lnSpc>
+              <a:spcBef>
+                <a:spcPts val="0"/>
+              </a:spcBef>
+              <a:spcAft>
+                <a:spcPts val="0"/>
+              </a:spcAft>
+              <a:buNone/>
+              <a:tabLst/>
+            </a:pPr>
+            <a:endParaRPr lang="de-DE" sz="1800" b="0" i="0" u="none" strike="noStrike" kern="1200">
+              <a:ln>
+                <a:noFill/>
+              </a:ln>
+              <a:latin typeface="Arial" pitchFamily="18"/>
+              <a:ea typeface="Andale Sans UI" pitchFamily="2"/>
+              <a:cs typeface="Tahoma" pitchFamily="2"/>
+            </a:endParaRPr>
+          </a:p>
+        </p:txBody>
+      </p:sp>
+    </p:spTree>
+    <p:extLst>
+      <p:ext uri="{BB962C8B-B14F-4D97-AF65-F5344CB8AC3E}">
+        <p14:creationId xmlns:p14="http://schemas.microsoft.com/office/powerpoint/2010/main" val="224992256"/>
+      </p:ext>
+    </p:extLst>
+  </p:cSld>
+  <p:clrMapOvr>
+    <a:masterClrMapping/>
+  </p:clrMapOvr>
+  <mc:AlternateContent xmlns:mc="http://schemas.openxmlformats.org/markup-compatibility/2006">
+    <mc:Choice xmlns:p14="http://schemas.microsoft.com/office/powerpoint/2010/main" Requires="p14">
+      <p:transition spd="slow" p14:dur="2000"/>
+    </mc:Choice>
+    <mc:Fallback>
+      <p:transition spd="slow"/>
+    </mc:Fallback>
+  </mc:AlternateContent>
+  <p:timing>
+    <p:tnLst>
+      <p:par>
+        <p:cTn id="1" dur="indefinite" restart="never" nodeType="tmRoot"/>
+      </p:par>
+    </p:tnLst>
+  </p:timing>
+</p:sld>
+</file>
+
+<file path=ppt/slides/slide6.xml><?xml version="1.0" encoding="utf-8"?>
+<p:sld xmlns:a="http://schemas.openxmlformats.org/drawingml/2006/main" xmlns:r="http://schemas.openxmlformats.org/officeDocument/2006/relationships" xmlns:p="http://schemas.openxmlformats.org/presentationml/2006/main">
+  <p:cSld>
+    <p:spTree>
+      <p:nvGrpSpPr>
+        <p:cNvPr id="1" name=""/>
+        <p:cNvGrpSpPr/>
+        <p:nvPr/>
+      </p:nvGrpSpPr>
+      <p:grpSpPr>
+        <a:xfrm>
+          <a:off x="0" y="0"/>
+          <a:ext cx="0" cy="0"/>
+          <a:chOff x="0" y="0"/>
+          <a:chExt cx="0" cy="0"/>
+        </a:xfrm>
+      </p:grpSpPr>
+      <p:pic>
+        <p:nvPicPr>
+          <p:cNvPr id="10" name="Grafik 9"/>
+          <p:cNvPicPr>
+            <a:picLocks noChangeAspect="1"/>
+          </p:cNvPicPr>
+          <p:nvPr/>
+        </p:nvPicPr>
+        <p:blipFill>
+          <a:blip r:embed="rId3">
+            <a:extLst>
+              <a:ext uri="{28A0092B-C50C-407E-A947-70E740481C1C}">
+                <a14:useLocalDpi xmlns:a14="http://schemas.microsoft.com/office/drawing/2010/main" val="0"/>
+              </a:ext>
+            </a:extLst>
+          </a:blip>
+          <a:stretch>
+            <a:fillRect/>
+          </a:stretch>
+        </p:blipFill>
+        <p:spPr>
+          <a:xfrm>
+            <a:off x="7510072" y="72000"/>
+            <a:ext cx="2391615" cy="1214789"/>
+          </a:xfrm>
+          <a:prstGeom prst="rect">
+            <a:avLst/>
+          </a:prstGeom>
+        </p:spPr>
+      </p:pic>
+      <p:sp>
+        <p:nvSpPr>
+          <p:cNvPr id="7" name="Datumsplatzhalter 1"/>
+          <p:cNvSpPr>
+            <a:spLocks noGrp="1"/>
+          </p:cNvSpPr>
+          <p:nvPr>
+            <p:ph type="dt" sz="half" idx="10"/>
+          </p:nvPr>
+        </p:nvSpPr>
+        <p:spPr/>
+        <p:txBody>
+          <a:bodyPr/>
+          <a:lstStyle/>
+          <a:p>
+            <a:pPr lvl="0"/>
+            <a:fld id="{73EB4CEC-1371-4CB6-8F44-5A689661CE91}" type="datetimeFigureOut">
+              <a:t>04.11.2015</a:t>
+            </a:fld>
+            <a:endParaRPr lang="x-none"/>
+          </a:p>
+        </p:txBody>
+      </p:sp>
+      <p:sp>
+        <p:nvSpPr>
+          <p:cNvPr id="8" name="Fußzeilenplatzhalter 2"/>
+          <p:cNvSpPr>
+            <a:spLocks noGrp="1"/>
+          </p:cNvSpPr>
+          <p:nvPr>
+            <p:ph type="ftr" sz="quarter" idx="11"/>
+          </p:nvPr>
+        </p:nvSpPr>
+        <p:spPr/>
+        <p:txBody>
+          <a:bodyPr/>
+          <a:lstStyle/>
+          <a:p>
+            <a:pPr lvl="0"/>
+            <a:r>
+              <a:rPr lang="x-none" smtClean="0"/>
+              <a:t>Kai Köster und Erik Svenonius</a:t>
+            </a:r>
+            <a:endParaRPr lang="x-none"/>
+          </a:p>
+        </p:txBody>
+      </p:sp>
+      <p:sp>
+        <p:nvSpPr>
+          <p:cNvPr id="9" name="Foliennummernplatzhalter 3"/>
+          <p:cNvSpPr>
+            <a:spLocks noGrp="1"/>
+          </p:cNvSpPr>
+          <p:nvPr>
+            <p:ph type="sldNum" sz="quarter" idx="12"/>
+          </p:nvPr>
+        </p:nvSpPr>
+        <p:spPr/>
+        <p:txBody>
+          <a:bodyPr/>
+          <a:lstStyle/>
+          <a:p>
+            <a:pPr lvl="0"/>
+            <a:fld id="{74D86CA0-BD5C-4A7E-8D6D-C071106A5058}" type="slidenum">
+              <a:t>6</a:t>
+            </a:fld>
+            <a:endParaRPr lang="x-none"/>
+          </a:p>
+        </p:txBody>
+      </p:sp>
+      <p:sp>
+        <p:nvSpPr>
+          <p:cNvPr id="3" name="Gerader Verbinder 2"/>
+          <p:cNvSpPr/>
+          <p:nvPr/>
+        </p:nvSpPr>
+        <p:spPr>
+          <a:xfrm>
+            <a:off x="-180000" y="1044000"/>
+            <a:ext cx="10800000" cy="0"/>
+          </a:xfrm>
+          <a:prstGeom prst="line">
+            <a:avLst/>
+          </a:prstGeom>
+          <a:noFill/>
+          <a:ln w="0">
+            <a:solidFill>
+              <a:srgbClr val="000000"/>
+            </a:solidFill>
+            <a:prstDash val="solid"/>
+          </a:ln>
+        </p:spPr>
+        <p:txBody>
+          <a:bodyPr vert="horz" wrap="none" lIns="90000" tIns="45000" rIns="90000" bIns="45000" anchor="ctr" anchorCtr="1" compatLnSpc="0"/>
+          <a:lstStyle/>
+          <a:p>
+            <a:pPr marL="0" marR="0" lvl="0" indent="0" rtl="0" hangingPunct="0">
+              <a:lnSpc>
+                <a:spcPct val="100000"/>
+              </a:lnSpc>
+              <a:spcBef>
+                <a:spcPts val="0"/>
+              </a:spcBef>
+              <a:spcAft>
+                <a:spcPts val="0"/>
+              </a:spcAft>
+              <a:buNone/>
+              <a:tabLst/>
+            </a:pPr>
+            <a:endParaRPr lang="de-DE" sz="1800" b="0" i="0" u="none" strike="noStrike" kern="1200">
+              <a:ln>
+                <a:noFill/>
+              </a:ln>
+              <a:latin typeface="Arial" pitchFamily="18"/>
+              <a:ea typeface="Andale Sans UI" pitchFamily="2"/>
+              <a:cs typeface="Tahoma" pitchFamily="2"/>
+            </a:endParaRPr>
+          </a:p>
+        </p:txBody>
+      </p:sp>
+      <p:sp>
+        <p:nvSpPr>
+          <p:cNvPr id="4" name="Textfeld 3"/>
+          <p:cNvSpPr txBox="1"/>
+          <p:nvPr/>
+        </p:nvSpPr>
+        <p:spPr>
+          <a:xfrm>
+            <a:off x="469440" y="360000"/>
+            <a:ext cx="2230560" cy="432720"/>
+          </a:xfrm>
+          <a:prstGeom prst="rect">
+            <a:avLst/>
+          </a:prstGeom>
+          <a:noFill/>
+          <a:ln>
+            <a:noFill/>
+          </a:ln>
+        </p:spPr>
+        <p:txBody>
+          <a:bodyPr vert="horz" wrap="none" lIns="90000" tIns="45000" rIns="90000" bIns="45000" compatLnSpc="0">
+            <a:spAutoFit/>
+          </a:bodyPr>
+          <a:lstStyle/>
+          <a:p>
+            <a:pPr marL="0" marR="0" lvl="0" indent="0" rtl="0" hangingPunct="0">
+              <a:lnSpc>
+                <a:spcPct val="100000"/>
+              </a:lnSpc>
+              <a:spcBef>
+                <a:spcPts val="0"/>
+              </a:spcBef>
+              <a:spcAft>
+                <a:spcPts val="0"/>
+              </a:spcAft>
+              <a:buNone/>
+              <a:tabLst/>
+              <a:defRPr sz="1800"/>
+            </a:pPr>
+            <a:r>
+              <a:rPr lang="de-DE" sz="1800" b="0" i="0" u="none" strike="noStrike" kern="1200">
+                <a:ln>
+                  <a:noFill/>
+                </a:ln>
+                <a:latin typeface="Arial" pitchFamily="18"/>
+                <a:ea typeface="Andale Sans UI" pitchFamily="2"/>
+                <a:cs typeface="Tahoma" pitchFamily="2"/>
+              </a:rPr>
+              <a:t>Softwareverifikation</a:t>
+            </a:r>
+          </a:p>
+        </p:txBody>
+      </p:sp>
+      <p:sp>
+        <p:nvSpPr>
+          <p:cNvPr id="5" name="Gerader Verbinder 4"/>
+          <p:cNvSpPr/>
+          <p:nvPr/>
+        </p:nvSpPr>
+        <p:spPr>
+          <a:xfrm>
+            <a:off x="360000" y="72000"/>
+            <a:ext cx="0" cy="900000"/>
+          </a:xfrm>
+          <a:prstGeom prst="line">
+            <a:avLst/>
+          </a:prstGeom>
+          <a:noFill/>
+          <a:ln w="180000">
+            <a:solidFill>
+              <a:srgbClr val="FF3333"/>
+            </a:solidFill>
+            <a:prstDash val="solid"/>
+          </a:ln>
+        </p:spPr>
+        <p:txBody>
+          <a:bodyPr vert="horz" wrap="none" lIns="180000" tIns="135000" rIns="180000" bIns="135000" anchor="ctr" anchorCtr="1" compatLnSpc="0"/>
+          <a:lstStyle/>
+          <a:p>
+            <a:pPr marL="0" marR="0" lvl="0" indent="0" rtl="0" hangingPunct="0">
+              <a:lnSpc>
+                <a:spcPct val="100000"/>
+              </a:lnSpc>
+              <a:spcBef>
+                <a:spcPts val="0"/>
+              </a:spcBef>
+              <a:spcAft>
+                <a:spcPts val="0"/>
+              </a:spcAft>
+              <a:buNone/>
+              <a:tabLst/>
+            </a:pPr>
+            <a:endParaRPr lang="de-DE" sz="1800" b="0" i="0" u="none" strike="noStrike" kern="1200">
+              <a:ln>
+                <a:noFill/>
+              </a:ln>
+              <a:latin typeface="Arial" pitchFamily="18"/>
+              <a:ea typeface="Andale Sans UI" pitchFamily="2"/>
+              <a:cs typeface="Tahoma" pitchFamily="2"/>
+            </a:endParaRPr>
+          </a:p>
+        </p:txBody>
+      </p:sp>
+      <p:sp>
+        <p:nvSpPr>
+          <p:cNvPr id="2" name="Textfeld 1"/>
+          <p:cNvSpPr txBox="1"/>
+          <p:nvPr/>
+        </p:nvSpPr>
+        <p:spPr>
+          <a:xfrm>
+            <a:off x="1424066" y="3597639"/>
+            <a:ext cx="7585023" cy="646331"/>
+          </a:xfrm>
+          <a:prstGeom prst="rect">
+            <a:avLst/>
+          </a:prstGeom>
+          <a:noFill/>
+        </p:spPr>
+        <p:txBody>
+          <a:bodyPr wrap="square" rtlCol="0">
+            <a:spAutoFit/>
+          </a:bodyPr>
+          <a:lstStyle/>
+          <a:p>
+            <a:r>
+              <a:rPr lang="de-DE" sz="3600" dirty="0" smtClean="0"/>
+              <a:t>Vielen Dank für Ihre Aufmerksamkeit</a:t>
+            </a:r>
+            <a:endParaRPr lang="de-DE" sz="3600" dirty="0"/>
+          </a:p>
+        </p:txBody>
+      </p:sp>
+    </p:spTree>
+    <p:extLst>
+      <p:ext uri="{BB962C8B-B14F-4D97-AF65-F5344CB8AC3E}">
+        <p14:creationId xmlns:p14="http://schemas.microsoft.com/office/powerpoint/2010/main" val="1371026154"/>
+      </p:ext>
+    </p:extLst>
+  </p:cSld>
+  <p:clrMapOvr>
+    <a:masterClrMapping/>
+  </p:clrMapOvr>
+  <mc:AlternateContent xmlns:mc="http://schemas.openxmlformats.org/markup-compatibility/2006">
+    <mc:Choice xmlns:p14="http://schemas.microsoft.com/office/powerpoint/2010/main" Requires="p14">
+      <p:transition spd="slow" p14:dur="2000"/>
+    </mc:Choice>
+    <mc:Fallback>
+      <p:transition spd="slow"/>
+    </mc:Fallback>
+  </mc:AlternateContent>
+  <p:timing>
+    <p:tnLst>
+      <p:par>
+        <p:cTn id="1" dur="indefinite" restart="never" nodeType="tmRoot"/>
+      </p:par>
+    </p:tnLst>
+  </p:timing>
+</p:sld>
+</file>
+
+<file path=ppt/slides/slide7.xml><?xml version="1.0" encoding="utf-8"?>
+<p:sld xmlns:a="http://schemas.openxmlformats.org/drawingml/2006/main" xmlns:r="http://schemas.openxmlformats.org/officeDocument/2006/relationships" xmlns:p="http://schemas.openxmlformats.org/presentationml/2006/main">
+  <p:cSld>
+    <p:spTree>
+      <p:nvGrpSpPr>
+        <p:cNvPr id="1" name=""/>
+        <p:cNvGrpSpPr/>
+        <p:nvPr/>
+      </p:nvGrpSpPr>
+      <p:grpSpPr>
+        <a:xfrm>
+          <a:off x="0" y="0"/>
+          <a:ext cx="0" cy="0"/>
+          <a:chOff x="0" y="0"/>
+          <a:chExt cx="0" cy="0"/>
+        </a:xfrm>
+      </p:grpSpPr>
+      <p:pic>
+        <p:nvPicPr>
+          <p:cNvPr id="10" name="Grafik 9"/>
+          <p:cNvPicPr>
+            <a:picLocks noChangeAspect="1"/>
+          </p:cNvPicPr>
+          <p:nvPr/>
+        </p:nvPicPr>
+        <p:blipFill>
+          <a:blip r:embed="rId3">
+            <a:extLst>
+              <a:ext uri="{28A0092B-C50C-407E-A947-70E740481C1C}">
+                <a14:useLocalDpi xmlns:a14="http://schemas.microsoft.com/office/drawing/2010/main" val="0"/>
+              </a:ext>
+            </a:extLst>
+          </a:blip>
+          <a:stretch>
+            <a:fillRect/>
+          </a:stretch>
+        </p:blipFill>
+        <p:spPr>
+          <a:xfrm>
+            <a:off x="7510072" y="72000"/>
+            <a:ext cx="2391615" cy="1214789"/>
+          </a:xfrm>
+          <a:prstGeom prst="rect">
+            <a:avLst/>
+          </a:prstGeom>
+        </p:spPr>
+      </p:pic>
+      <p:sp>
+        <p:nvSpPr>
+          <p:cNvPr id="7" name="Datumsplatzhalter 1"/>
+          <p:cNvSpPr>
+            <a:spLocks noGrp="1"/>
+          </p:cNvSpPr>
+          <p:nvPr>
+            <p:ph type="dt" sz="half" idx="10"/>
+          </p:nvPr>
+        </p:nvSpPr>
+        <p:spPr/>
+        <p:txBody>
+          <a:bodyPr/>
+          <a:lstStyle/>
+          <a:p>
+            <a:pPr lvl="0"/>
+            <a:fld id="{73EB4CEC-1371-4CB6-8F44-5A689661CE91}" type="datetimeFigureOut">
+              <a:t>04.11.2015</a:t>
+            </a:fld>
+            <a:endParaRPr lang="x-none"/>
+          </a:p>
+        </p:txBody>
+      </p:sp>
+      <p:sp>
+        <p:nvSpPr>
+          <p:cNvPr id="8" name="Fußzeilenplatzhalter 2"/>
+          <p:cNvSpPr>
+            <a:spLocks noGrp="1"/>
+          </p:cNvSpPr>
+          <p:nvPr>
+            <p:ph type="ftr" sz="quarter" idx="11"/>
+          </p:nvPr>
+        </p:nvSpPr>
+        <p:spPr/>
+        <p:txBody>
+          <a:bodyPr/>
+          <a:lstStyle/>
+          <a:p>
+            <a:pPr lvl="0"/>
+            <a:r>
+              <a:rPr lang="x-none" smtClean="0"/>
+              <a:t>Kai Köster und Erik Svenonius</a:t>
+            </a:r>
+            <a:endParaRPr lang="x-none"/>
+          </a:p>
+        </p:txBody>
+      </p:sp>
+      <p:sp>
+        <p:nvSpPr>
+          <p:cNvPr id="9" name="Foliennummernplatzhalter 3"/>
+          <p:cNvSpPr>
+            <a:spLocks noGrp="1"/>
+          </p:cNvSpPr>
+          <p:nvPr>
+            <p:ph type="sldNum" sz="quarter" idx="12"/>
+          </p:nvPr>
+        </p:nvSpPr>
+        <p:spPr/>
+        <p:txBody>
+          <a:bodyPr/>
+          <a:lstStyle/>
+          <a:p>
+            <a:pPr lvl="0"/>
+            <a:fld id="{74D86CA0-BD5C-4A7E-8D6D-C071106A5058}" type="slidenum">
+              <a:t>7</a:t>
+            </a:fld>
+            <a:endParaRPr lang="x-none"/>
+          </a:p>
+        </p:txBody>
+      </p:sp>
+      <p:sp>
+        <p:nvSpPr>
+          <p:cNvPr id="3" name="Gerader Verbinder 2"/>
+          <p:cNvSpPr/>
+          <p:nvPr/>
+        </p:nvSpPr>
+        <p:spPr>
+          <a:xfrm>
+            <a:off x="-180000" y="1044000"/>
+            <a:ext cx="10800000" cy="0"/>
+          </a:xfrm>
+          <a:prstGeom prst="line">
+            <a:avLst/>
+          </a:prstGeom>
+          <a:noFill/>
+          <a:ln w="0">
+            <a:solidFill>
+              <a:srgbClr val="000000"/>
+            </a:solidFill>
+            <a:prstDash val="solid"/>
+          </a:ln>
+        </p:spPr>
+        <p:txBody>
+          <a:bodyPr vert="horz" wrap="none" lIns="90000" tIns="45000" rIns="90000" bIns="45000" anchor="ctr" anchorCtr="1" compatLnSpc="0"/>
+          <a:lstStyle/>
+          <a:p>
+            <a:pPr marL="0" marR="0" lvl="0" indent="0" rtl="0" hangingPunct="0">
+              <a:lnSpc>
+                <a:spcPct val="100000"/>
+              </a:lnSpc>
+              <a:spcBef>
+                <a:spcPts val="0"/>
+              </a:spcBef>
+              <a:spcAft>
+                <a:spcPts val="0"/>
+              </a:spcAft>
+              <a:buNone/>
+              <a:tabLst/>
+            </a:pPr>
+            <a:endParaRPr lang="de-DE" sz="1800" b="0" i="0" u="none" strike="noStrike" kern="1200">
+              <a:ln>
+                <a:noFill/>
+              </a:ln>
+              <a:latin typeface="Arial" pitchFamily="18"/>
+              <a:ea typeface="Andale Sans UI" pitchFamily="2"/>
+              <a:cs typeface="Tahoma" pitchFamily="2"/>
+            </a:endParaRPr>
+          </a:p>
+        </p:txBody>
+      </p:sp>
+      <p:sp>
+        <p:nvSpPr>
+          <p:cNvPr id="4" name="Textfeld 3"/>
+          <p:cNvSpPr txBox="1"/>
+          <p:nvPr/>
+        </p:nvSpPr>
+        <p:spPr>
+          <a:xfrm>
+            <a:off x="469440" y="360000"/>
+            <a:ext cx="2230560" cy="432720"/>
+          </a:xfrm>
+          <a:prstGeom prst="rect">
+            <a:avLst/>
+          </a:prstGeom>
+          <a:noFill/>
+          <a:ln>
+            <a:noFill/>
+          </a:ln>
+        </p:spPr>
+        <p:txBody>
+          <a:bodyPr vert="horz" wrap="none" lIns="90000" tIns="45000" rIns="90000" bIns="45000" compatLnSpc="0">
+            <a:spAutoFit/>
+          </a:bodyPr>
+          <a:lstStyle/>
+          <a:p>
+            <a:pPr marL="0" marR="0" lvl="0" indent="0" rtl="0" hangingPunct="0">
+              <a:lnSpc>
+                <a:spcPct val="100000"/>
+              </a:lnSpc>
+              <a:spcBef>
+                <a:spcPts val="0"/>
+              </a:spcBef>
+              <a:spcAft>
+                <a:spcPts val="0"/>
+              </a:spcAft>
+              <a:buNone/>
+              <a:tabLst/>
+              <a:defRPr sz="1800"/>
+            </a:pPr>
+            <a:r>
+              <a:rPr lang="de-DE" sz="1800" b="0" i="0" u="none" strike="noStrike" kern="1200">
+                <a:ln>
+                  <a:noFill/>
+                </a:ln>
+                <a:latin typeface="Arial" pitchFamily="18"/>
+                <a:ea typeface="Andale Sans UI" pitchFamily="2"/>
+                <a:cs typeface="Tahoma" pitchFamily="2"/>
+              </a:rPr>
+              <a:t>Softwareverifikation</a:t>
+            </a:r>
+          </a:p>
+        </p:txBody>
+      </p:sp>
+      <p:sp>
+        <p:nvSpPr>
+          <p:cNvPr id="5" name="Gerader Verbinder 4"/>
+          <p:cNvSpPr/>
+          <p:nvPr/>
+        </p:nvSpPr>
+        <p:spPr>
+          <a:xfrm>
+            <a:off x="360000" y="72000"/>
+            <a:ext cx="0" cy="900000"/>
+          </a:xfrm>
+          <a:prstGeom prst="line">
+            <a:avLst/>
+          </a:prstGeom>
+          <a:noFill/>
+          <a:ln w="180000">
+            <a:solidFill>
+              <a:srgbClr val="FF3333"/>
+            </a:solidFill>
+            <a:prstDash val="solid"/>
+          </a:ln>
+        </p:spPr>
+        <p:txBody>
+          <a:bodyPr vert="horz" wrap="none" lIns="180000" tIns="135000" rIns="180000" bIns="135000" anchor="ctr" anchorCtr="1" compatLnSpc="0"/>
+          <a:lstStyle/>
+          <a:p>
+            <a:pPr marL="0" marR="0" lvl="0" indent="0" rtl="0" hangingPunct="0">
+              <a:lnSpc>
+                <a:spcPct val="100000"/>
+              </a:lnSpc>
+              <a:spcBef>
+                <a:spcPts val="0"/>
+              </a:spcBef>
+              <a:spcAft>
+                <a:spcPts val="0"/>
+              </a:spcAft>
+              <a:buNone/>
+              <a:tabLst/>
+            </a:pPr>
+            <a:endParaRPr lang="de-DE" sz="1800" b="0" i="0" u="none" strike="noStrike" kern="1200">
+              <a:ln>
+                <a:noFill/>
+              </a:ln>
+              <a:latin typeface="Arial" pitchFamily="18"/>
+              <a:ea typeface="Andale Sans UI" pitchFamily="2"/>
+              <a:cs typeface="Tahoma" pitchFamily="2"/>
+            </a:endParaRPr>
+          </a:p>
+        </p:txBody>
+      </p:sp>
+    </p:spTree>
+    <p:extLst>
+      <p:ext uri="{BB962C8B-B14F-4D97-AF65-F5344CB8AC3E}">
+        <p14:creationId xmlns:p14="http://schemas.microsoft.com/office/powerpoint/2010/main" val="3050347589"/>
       </p:ext>
     </p:extLst>
   </p:cSld>

</xml_diff>

<commit_message>
1 folie hinzugefügt komm nach her mal bei skyp on damit wir noch mal drüber sprechen können
</commit_message>
<xml_diff>
--- a/Ausarbeitung/Präsentation.pptx
+++ b/Ausarbeitung/Präsentation.pptx
@@ -4496,7 +4496,7 @@
           <a:p>
             <a:pPr lvl="0"/>
             <a:fld id="{73EB4CEC-1371-4CB6-8F44-5A689661CE91}" type="datetimeFigureOut">
-              <a:t>05.11.2015</a:t>
+              <a:t>08.11.2015</a:t>
             </a:fld>
             <a:endParaRPr lang="x-none"/>
           </a:p>
@@ -4888,7 +4888,7 @@
           <a:p>
             <a:pPr lvl="0"/>
             <a:fld id="{73EB4CEC-1371-4CB6-8F44-5A689661CE91}" type="datetimeFigureOut">
-              <a:t>05.11.2015</a:t>
+              <a:t>08.11.2015</a:t>
             </a:fld>
             <a:endParaRPr lang="x-none"/>
           </a:p>
@@ -5567,7 +5567,7 @@
           <a:p>
             <a:pPr lvl="0"/>
             <a:fld id="{73EB4CEC-1371-4CB6-8F44-5A689661CE91}" type="datetimeFigureOut">
-              <a:t>05.11.2015</a:t>
+              <a:t>08.11.2015</a:t>
             </a:fld>
             <a:endParaRPr lang="x-none"/>
           </a:p>
@@ -5926,7 +5926,7 @@
           <a:p>
             <a:pPr lvl="0"/>
             <a:fld id="{73EB4CEC-1371-4CB6-8F44-5A689661CE91}" type="datetimeFigureOut">
-              <a:t>05.11.2015</a:t>
+              <a:t>08.11.2015</a:t>
             </a:fld>
             <a:endParaRPr lang="x-none"/>
           </a:p>
@@ -6129,6 +6129,445 @@
               <a:ea typeface="Andale Sans UI" pitchFamily="2"/>
               <a:cs typeface="Tahoma" pitchFamily="2"/>
             </a:endParaRPr>
+          </a:p>
+        </p:txBody>
+      </p:sp>
+      <p:sp>
+        <p:nvSpPr>
+          <p:cNvPr id="11" name="Textfeld 10"/>
+          <p:cNvSpPr txBox="1"/>
+          <p:nvPr/>
+        </p:nvSpPr>
+        <p:spPr>
+          <a:xfrm>
+            <a:off x="1207378" y="1503110"/>
+            <a:ext cx="7674964" cy="523220"/>
+          </a:xfrm>
+          <a:prstGeom prst="rect">
+            <a:avLst/>
+          </a:prstGeom>
+          <a:noFill/>
+        </p:spPr>
+        <p:txBody>
+          <a:bodyPr wrap="square" rtlCol="0">
+            <a:spAutoFit/>
+          </a:bodyPr>
+          <a:lstStyle/>
+          <a:p>
+            <a:pPr algn="ctr"/>
+            <a:r>
+              <a:rPr lang="de-DE" sz="2800" dirty="0" smtClean="0"/>
+              <a:t>Schwierigkeiten</a:t>
+            </a:r>
+            <a:endParaRPr lang="de-DE" sz="2800" dirty="0"/>
+          </a:p>
+        </p:txBody>
+      </p:sp>
+      <p:sp>
+        <p:nvSpPr>
+          <p:cNvPr id="12" name="Textfeld 11"/>
+          <p:cNvSpPr txBox="1"/>
+          <p:nvPr/>
+        </p:nvSpPr>
+        <p:spPr>
+          <a:xfrm>
+            <a:off x="1207378" y="2900075"/>
+            <a:ext cx="7950910" cy="2308324"/>
+          </a:xfrm>
+          <a:prstGeom prst="rect">
+            <a:avLst/>
+          </a:prstGeom>
+          <a:noFill/>
+        </p:spPr>
+        <p:txBody>
+          <a:bodyPr wrap="square" rtlCol="0">
+            <a:spAutoFit/>
+          </a:bodyPr>
+          <a:lstStyle/>
+          <a:p>
+            <a:pPr marL="285750" indent="-285750">
+              <a:buFontTx/>
+              <a:buChar char="-"/>
+            </a:pPr>
+            <a:r>
+              <a:rPr lang="de-DE" dirty="0" err="1"/>
+              <a:t>ensures</a:t>
+            </a:r>
+            <a:r>
+              <a:rPr lang="de-DE" dirty="0"/>
+              <a:t> </a:t>
+            </a:r>
+            <a:r>
+              <a:rPr lang="de-DE" dirty="0" err="1"/>
+              <a:t>old</a:t>
+            </a:r>
+            <a:r>
+              <a:rPr lang="de-DE" dirty="0"/>
+              <a:t> (</a:t>
+            </a:r>
+            <a:r>
+              <a:rPr lang="de-DE" dirty="0" err="1"/>
+              <a:t>que</a:t>
+            </a:r>
+            <a:r>
+              <a:rPr lang="de-DE" dirty="0"/>
+              <a:t>[0].</a:t>
+            </a:r>
+            <a:r>
+              <a:rPr lang="de-DE" dirty="0" err="1"/>
+              <a:t>usedCPU</a:t>
+            </a:r>
+            <a:r>
+              <a:rPr lang="de-DE" dirty="0"/>
+              <a:t> + </a:t>
+            </a:r>
+            <a:r>
+              <a:rPr lang="de-DE" dirty="0" err="1"/>
+              <a:t>quantum</a:t>
+            </a:r>
+            <a:r>
+              <a:rPr lang="de-DE" dirty="0"/>
+              <a:t> &lt; </a:t>
+            </a:r>
+            <a:r>
+              <a:rPr lang="de-DE" dirty="0" err="1"/>
+              <a:t>que</a:t>
+            </a:r>
+            <a:r>
+              <a:rPr lang="de-DE" dirty="0"/>
+              <a:t>[0].</a:t>
+            </a:r>
+            <a:r>
+              <a:rPr lang="de-DE" dirty="0" err="1"/>
+              <a:t>duration</a:t>
+            </a:r>
+            <a:r>
+              <a:rPr lang="de-DE" dirty="0"/>
+              <a:t>) ==&gt; </a:t>
+            </a:r>
+          </a:p>
+          <a:p>
+            <a:r>
+              <a:rPr lang="de-DE" dirty="0" smtClean="0"/>
+              <a:t>|</a:t>
+            </a:r>
+            <a:r>
+              <a:rPr lang="de-DE" dirty="0" err="1"/>
+              <a:t>que</a:t>
+            </a:r>
+            <a:r>
+              <a:rPr lang="de-DE" dirty="0"/>
+              <a:t>| == </a:t>
+            </a:r>
+            <a:r>
+              <a:rPr lang="de-DE" dirty="0" err="1"/>
+              <a:t>old</a:t>
+            </a:r>
+            <a:r>
+              <a:rPr lang="de-DE" dirty="0"/>
+              <a:t>(|</a:t>
+            </a:r>
+            <a:r>
+              <a:rPr lang="de-DE" dirty="0" err="1"/>
+              <a:t>que</a:t>
+            </a:r>
+            <a:r>
+              <a:rPr lang="de-DE" dirty="0"/>
+              <a:t>|) &amp;&amp; Valid() &amp;&amp; </a:t>
+            </a:r>
+            <a:endParaRPr lang="de-DE" dirty="0" smtClean="0"/>
+          </a:p>
+          <a:p>
+            <a:r>
+              <a:rPr lang="de-DE" dirty="0" err="1" smtClean="0"/>
+              <a:t>inQue</a:t>
+            </a:r>
+            <a:r>
+              <a:rPr lang="de-DE" dirty="0" smtClean="0"/>
+              <a:t>(</a:t>
+            </a:r>
+            <a:r>
+              <a:rPr lang="de-DE" dirty="0" err="1" smtClean="0"/>
+              <a:t>old</a:t>
+            </a:r>
+            <a:r>
+              <a:rPr lang="de-DE" dirty="0" smtClean="0"/>
+              <a:t>(</a:t>
+            </a:r>
+            <a:r>
+              <a:rPr lang="de-DE" dirty="0" err="1" smtClean="0"/>
+              <a:t>que</a:t>
+            </a:r>
+            <a:r>
+              <a:rPr lang="de-DE" dirty="0" smtClean="0"/>
+              <a:t>[0</a:t>
+            </a:r>
+            <a:r>
+              <a:rPr lang="de-DE" dirty="0"/>
+              <a:t>].</a:t>
+            </a:r>
+            <a:r>
+              <a:rPr lang="de-DE" dirty="0" err="1"/>
+              <a:t>getPid</a:t>
+            </a:r>
+            <a:r>
+              <a:rPr lang="de-DE" dirty="0"/>
+              <a:t>()))&amp;&amp; </a:t>
+            </a:r>
+            <a:r>
+              <a:rPr lang="de-DE" dirty="0" err="1"/>
+              <a:t>exists</a:t>
+            </a:r>
+            <a:r>
+              <a:rPr lang="de-DE" dirty="0"/>
+              <a:t> </a:t>
+            </a:r>
+            <a:r>
+              <a:rPr lang="de-DE" dirty="0" err="1"/>
+              <a:t>pcb</a:t>
+            </a:r>
+            <a:r>
+              <a:rPr lang="de-DE" dirty="0"/>
+              <a:t>: </a:t>
+            </a:r>
+            <a:r>
+              <a:rPr lang="de-DE" dirty="0" err="1"/>
+              <a:t>PCB_t</a:t>
+            </a:r>
+            <a:r>
+              <a:rPr lang="de-DE" dirty="0"/>
+              <a:t>:: (</a:t>
+            </a:r>
+            <a:r>
+              <a:rPr lang="de-DE" dirty="0" err="1"/>
+              <a:t>pcb</a:t>
+            </a:r>
+            <a:r>
+              <a:rPr lang="de-DE" dirty="0"/>
+              <a:t> != null &amp;&amp; </a:t>
+            </a:r>
+            <a:r>
+              <a:rPr lang="de-DE" dirty="0" err="1"/>
+              <a:t>pcb</a:t>
+            </a:r>
+            <a:r>
+              <a:rPr lang="de-DE" dirty="0"/>
+              <a:t>==</a:t>
+            </a:r>
+            <a:r>
+              <a:rPr lang="de-DE" dirty="0" err="1"/>
+              <a:t>old</a:t>
+            </a:r>
+            <a:r>
+              <a:rPr lang="de-DE" dirty="0"/>
+              <a:t>(</a:t>
+            </a:r>
+            <a:r>
+              <a:rPr lang="de-DE" dirty="0" err="1"/>
+              <a:t>que</a:t>
+            </a:r>
+            <a:r>
+              <a:rPr lang="de-DE" dirty="0"/>
+              <a:t>[0]) &amp;&amp; </a:t>
+            </a:r>
+            <a:r>
+              <a:rPr lang="de-DE" dirty="0" err="1"/>
+              <a:t>que</a:t>
+            </a:r>
+            <a:r>
+              <a:rPr lang="de-DE" dirty="0"/>
+              <a:t>==</a:t>
+            </a:r>
+            <a:r>
+              <a:rPr lang="de-DE" dirty="0" err="1"/>
+              <a:t>old</a:t>
+            </a:r>
+            <a:r>
+              <a:rPr lang="de-DE" dirty="0"/>
+              <a:t>(</a:t>
+            </a:r>
+            <a:r>
+              <a:rPr lang="de-DE" dirty="0" err="1"/>
+              <a:t>que</a:t>
+            </a:r>
+            <a:r>
+              <a:rPr lang="de-DE" dirty="0"/>
+              <a:t>[1..]+[</a:t>
+            </a:r>
+            <a:r>
+              <a:rPr lang="de-DE" dirty="0" err="1"/>
+              <a:t>pcb</a:t>
+            </a:r>
+            <a:r>
+              <a:rPr lang="de-DE" dirty="0" smtClean="0"/>
+              <a:t>]));</a:t>
+            </a:r>
+          </a:p>
+          <a:p>
+            <a:endParaRPr lang="de-DE" dirty="0"/>
+          </a:p>
+          <a:p>
+            <a:pPr marL="285750" indent="-285750">
+              <a:buFontTx/>
+              <a:buChar char="-"/>
+            </a:pPr>
+            <a:r>
+              <a:rPr lang="de-DE" dirty="0" err="1" smtClean="0"/>
+              <a:t>ensures</a:t>
+            </a:r>
+            <a:r>
+              <a:rPr lang="de-DE" dirty="0" smtClean="0"/>
+              <a:t> </a:t>
+            </a:r>
+            <a:r>
+              <a:rPr lang="de-DE" dirty="0" err="1"/>
+              <a:t>old</a:t>
+            </a:r>
+            <a:r>
+              <a:rPr lang="de-DE" dirty="0"/>
+              <a:t> (</a:t>
+            </a:r>
+            <a:r>
+              <a:rPr lang="de-DE" dirty="0" err="1"/>
+              <a:t>que</a:t>
+            </a:r>
+            <a:r>
+              <a:rPr lang="de-DE" dirty="0"/>
+              <a:t>[0].</a:t>
+            </a:r>
+            <a:r>
+              <a:rPr lang="de-DE" dirty="0" err="1"/>
+              <a:t>usedCPU</a:t>
+            </a:r>
+            <a:r>
+              <a:rPr lang="de-DE" dirty="0"/>
+              <a:t> + </a:t>
+            </a:r>
+            <a:r>
+              <a:rPr lang="de-DE" dirty="0" err="1"/>
+              <a:t>quantum</a:t>
+            </a:r>
+            <a:r>
+              <a:rPr lang="de-DE" dirty="0"/>
+              <a:t> &gt;= </a:t>
+            </a:r>
+            <a:r>
+              <a:rPr lang="de-DE" dirty="0" err="1"/>
+              <a:t>que</a:t>
+            </a:r>
+            <a:r>
+              <a:rPr lang="de-DE" dirty="0"/>
+              <a:t>[0].</a:t>
+            </a:r>
+            <a:r>
+              <a:rPr lang="de-DE" dirty="0" err="1"/>
+              <a:t>duration</a:t>
+            </a:r>
+            <a:r>
+              <a:rPr lang="de-DE" dirty="0"/>
+              <a:t>) ==&gt; </a:t>
+            </a:r>
+          </a:p>
+          <a:p>
+            <a:r>
+              <a:rPr lang="de-DE" dirty="0" smtClean="0"/>
+              <a:t>|</a:t>
+            </a:r>
+            <a:r>
+              <a:rPr lang="de-DE" dirty="0" err="1"/>
+              <a:t>que</a:t>
+            </a:r>
+            <a:r>
+              <a:rPr lang="de-DE" dirty="0"/>
+              <a:t>|+1 == </a:t>
+            </a:r>
+            <a:r>
+              <a:rPr lang="de-DE" dirty="0" err="1"/>
+              <a:t>old</a:t>
+            </a:r>
+            <a:r>
+              <a:rPr lang="de-DE" dirty="0"/>
+              <a:t>(|</a:t>
+            </a:r>
+            <a:r>
+              <a:rPr lang="de-DE" dirty="0" err="1"/>
+              <a:t>que</a:t>
+            </a:r>
+            <a:r>
+              <a:rPr lang="de-DE" dirty="0"/>
+              <a:t>|) &amp;&amp; Valid() </a:t>
+            </a:r>
+            <a:r>
+              <a:rPr lang="de-DE" dirty="0" smtClean="0"/>
+              <a:t>&amp;&amp;</a:t>
+            </a:r>
+          </a:p>
+          <a:p>
+            <a:r>
+              <a:rPr lang="de-DE" dirty="0" smtClean="0"/>
+              <a:t> </a:t>
+            </a:r>
+            <a:r>
+              <a:rPr lang="de-DE" dirty="0"/>
+              <a:t>!</a:t>
+            </a:r>
+            <a:r>
+              <a:rPr lang="de-DE" dirty="0" err="1"/>
+              <a:t>inQue</a:t>
+            </a:r>
+            <a:r>
+              <a:rPr lang="de-DE" dirty="0"/>
+              <a:t>(</a:t>
+            </a:r>
+            <a:r>
+              <a:rPr lang="de-DE" dirty="0" err="1"/>
+              <a:t>old</a:t>
+            </a:r>
+            <a:r>
+              <a:rPr lang="de-DE" dirty="0"/>
+              <a:t>(</a:t>
+            </a:r>
+            <a:r>
+              <a:rPr lang="de-DE" dirty="0" err="1"/>
+              <a:t>que</a:t>
+            </a:r>
+            <a:r>
+              <a:rPr lang="de-DE" dirty="0"/>
+              <a:t>[0].</a:t>
+            </a:r>
+            <a:r>
+              <a:rPr lang="de-DE" dirty="0" err="1"/>
+              <a:t>getPid</a:t>
+            </a:r>
+            <a:r>
+              <a:rPr lang="de-DE" dirty="0"/>
+              <a:t>()))&amp;&amp; </a:t>
+            </a:r>
+            <a:r>
+              <a:rPr lang="de-DE" dirty="0" err="1"/>
+              <a:t>que</a:t>
+            </a:r>
+            <a:r>
+              <a:rPr lang="de-DE" dirty="0"/>
+              <a:t>==</a:t>
+            </a:r>
+            <a:r>
+              <a:rPr lang="de-DE" dirty="0" err="1"/>
+              <a:t>old</a:t>
+            </a:r>
+            <a:r>
+              <a:rPr lang="de-DE" dirty="0"/>
+              <a:t>(</a:t>
+            </a:r>
+            <a:r>
+              <a:rPr lang="de-DE" dirty="0" err="1"/>
+              <a:t>que</a:t>
+            </a:r>
+            <a:r>
+              <a:rPr lang="de-DE" dirty="0"/>
+              <a:t>[1..]);</a:t>
+            </a:r>
+            <a:endParaRPr lang="de-DE" dirty="0" smtClean="0"/>
           </a:p>
         </p:txBody>
       </p:sp>
@@ -6224,7 +6663,7 @@
           <a:p>
             <a:pPr lvl="0"/>
             <a:fld id="{73EB4CEC-1371-4CB6-8F44-5A689661CE91}" type="datetimeFigureOut">
-              <a:t>05.11.2015</a:t>
+              <a:t>08.11.2015</a:t>
             </a:fld>
             <a:endParaRPr lang="x-none"/>
           </a:p>
@@ -6522,7 +6961,7 @@
           <a:p>
             <a:pPr lvl="0"/>
             <a:fld id="{73EB4CEC-1371-4CB6-8F44-5A689661CE91}" type="datetimeFigureOut">
-              <a:t>05.11.2015</a:t>
+              <a:t>08.11.2015</a:t>
             </a:fld>
             <a:endParaRPr lang="x-none"/>
           </a:p>
@@ -6850,7 +7289,7 @@
           <a:p>
             <a:pPr lvl="0"/>
             <a:fld id="{73EB4CEC-1371-4CB6-8F44-5A689661CE91}" type="datetimeFigureOut">
-              <a:t>05.11.2015</a:t>
+              <a:t>08.11.2015</a:t>
             </a:fld>
             <a:endParaRPr lang="x-none"/>
           </a:p>

</xml_diff>

<commit_message>
fehler behoben, folie wurde entfernt.
</commit_message>
<xml_diff>
--- a/Ausarbeitung/Präsentation.pptx
+++ b/Ausarbeitung/Präsentation.pptx
@@ -5,19 +5,18 @@
     <p:sldMasterId id="2147483648" r:id="rId1"/>
   </p:sldMasterIdLst>
   <p:notesMasterIdLst>
-    <p:notesMasterId r:id="rId9"/>
+    <p:notesMasterId r:id="rId8"/>
   </p:notesMasterIdLst>
   <p:handoutMasterIdLst>
-    <p:handoutMasterId r:id="rId10"/>
+    <p:handoutMasterId r:id="rId9"/>
   </p:handoutMasterIdLst>
   <p:sldIdLst>
     <p:sldId id="256" r:id="rId2"/>
     <p:sldId id="257" r:id="rId3"/>
     <p:sldId id="258" r:id="rId4"/>
-    <p:sldId id="259" r:id="rId5"/>
-    <p:sldId id="260" r:id="rId6"/>
+    <p:sldId id="263" r:id="rId5"/>
+    <p:sldId id="259" r:id="rId6"/>
     <p:sldId id="261" r:id="rId7"/>
-    <p:sldId id="262" r:id="rId8"/>
   </p:sldIdLst>
   <p:sldSz cx="10080625" cy="7559675"/>
   <p:notesSz cx="7559675" cy="10691813"/>
@@ -1171,7 +1170,7 @@
     </p:spTree>
     <p:extLst>
       <p:ext uri="{BB962C8B-B14F-4D97-AF65-F5344CB8AC3E}">
-        <p14:creationId xmlns:p14="http://schemas.microsoft.com/office/powerpoint/2010/main" val="1074786919"/>
+        <p14:creationId xmlns:p14="http://schemas.microsoft.com/office/powerpoint/2010/main" val="300038857"/>
       </p:ext>
     </p:extLst>
   </p:cSld>
@@ -1282,7 +1281,7 @@
     </p:spTree>
     <p:extLst>
       <p:ext uri="{BB962C8B-B14F-4D97-AF65-F5344CB8AC3E}">
-        <p14:creationId xmlns:p14="http://schemas.microsoft.com/office/powerpoint/2010/main" val="3678967268"/>
+        <p14:creationId xmlns:p14="http://schemas.microsoft.com/office/powerpoint/2010/main" val="1074786919"/>
       </p:ext>
     </p:extLst>
   </p:cSld>
@@ -1394,117 +1393,6 @@
     <p:extLst>
       <p:ext uri="{BB962C8B-B14F-4D97-AF65-F5344CB8AC3E}">
         <p14:creationId xmlns:p14="http://schemas.microsoft.com/office/powerpoint/2010/main" val="498248915"/>
-      </p:ext>
-    </p:extLst>
-  </p:cSld>
-  <p:clrMapOvr>
-    <a:masterClrMapping/>
-  </p:clrMapOvr>
-</p:notes>
-</file>
-
-<file path=ppt/notesSlides/notesSlide7.xml><?xml version="1.0" encoding="utf-8"?>
-<p:notes xmlns:a="http://schemas.openxmlformats.org/drawingml/2006/main" xmlns:r="http://schemas.openxmlformats.org/officeDocument/2006/relationships" xmlns:p="http://schemas.openxmlformats.org/presentationml/2006/main">
-  <p:cSld>
-    <p:spTree>
-      <p:nvGrpSpPr>
-        <p:cNvPr id="1" name=""/>
-        <p:cNvGrpSpPr/>
-        <p:nvPr/>
-      </p:nvGrpSpPr>
-      <p:grpSpPr>
-        <a:xfrm>
-          <a:off x="0" y="0"/>
-          <a:ext cx="0" cy="0"/>
-          <a:chOff x="0" y="0"/>
-          <a:chExt cx="0" cy="0"/>
-        </a:xfrm>
-      </p:grpSpPr>
-      <p:sp>
-        <p:nvSpPr>
-          <p:cNvPr id="7" name="Foliennummernplatzhalter 6"/>
-          <p:cNvSpPr txBox="1">
-            <a:spLocks noGrp="1"/>
-          </p:cNvSpPr>
-          <p:nvPr>
-            <p:ph type="sldNum" sz="quarter" idx="5"/>
-          </p:nvPr>
-        </p:nvSpPr>
-        <p:spPr>
-          <a:ln/>
-        </p:spPr>
-        <p:txBody>
-          <a:bodyPr lIns="0" tIns="0" rIns="0" bIns="0" anchor="b">
-            <a:noAutofit/>
-          </a:bodyPr>
-          <a:lstStyle/>
-          <a:p>
-            <a:pPr lvl="0"/>
-            <a:fld id="{FF5DBC07-F90A-4106-833B-67AA97060579}" type="slidenum">
-              <a:t>7</a:t>
-            </a:fld>
-            <a:endParaRPr lang="x-none"/>
-          </a:p>
-        </p:txBody>
-      </p:sp>
-      <p:sp>
-        <p:nvSpPr>
-          <p:cNvPr id="2" name="Folienbildplatzhalter 1"/>
-          <p:cNvSpPr>
-            <a:spLocks noGrp="1" noRot="1" noChangeAspect="1" noResize="1"/>
-          </p:cNvSpPr>
-          <p:nvPr>
-            <p:ph type="sldImg"/>
-          </p:nvPr>
-        </p:nvSpPr>
-        <p:spPr>
-          <a:xfrm>
-            <a:off x="1106488" y="812800"/>
-            <a:ext cx="5345112" cy="4008438"/>
-          </a:xfrm>
-          <a:solidFill>
-            <a:schemeClr val="accent1"/>
-          </a:solidFill>
-          <a:ln w="25400">
-            <a:solidFill>
-              <a:schemeClr val="accent1">
-                <a:shade val="50000"/>
-              </a:schemeClr>
-            </a:solidFill>
-            <a:prstDash val="solid"/>
-          </a:ln>
-        </p:spPr>
-      </p:sp>
-      <p:sp>
-        <p:nvSpPr>
-          <p:cNvPr id="3" name="Notizenplatzhalter 2"/>
-          <p:cNvSpPr txBox="1">
-            <a:spLocks noGrp="1"/>
-          </p:cNvSpPr>
-          <p:nvPr>
-            <p:ph type="body" sz="quarter" idx="1"/>
-          </p:nvPr>
-        </p:nvSpPr>
-        <p:spPr>
-          <a:xfrm>
-            <a:off x="756000" y="5078520"/>
-            <a:ext cx="6047640" cy="4811400"/>
-          </a:xfrm>
-        </p:spPr>
-        <p:txBody>
-          <a:bodyPr>
-            <a:spAutoFit/>
-          </a:bodyPr>
-          <a:lstStyle/>
-          <a:p>
-            <a:endParaRPr lang="x-none"/>
-          </a:p>
-        </p:txBody>
-      </p:sp>
-    </p:spTree>
-    <p:extLst>
-      <p:ext uri="{BB962C8B-B14F-4D97-AF65-F5344CB8AC3E}">
-        <p14:creationId xmlns:p14="http://schemas.microsoft.com/office/powerpoint/2010/main" val="1292733340"/>
       </p:ext>
     </p:extLst>
   </p:cSld>
@@ -6172,7 +6060,7 @@
         <p:spPr>
           <a:xfrm>
             <a:off x="1207378" y="2900075"/>
-            <a:ext cx="7950910" cy="2308324"/>
+            <a:ext cx="7950910" cy="1754326"/>
           </a:xfrm>
           <a:prstGeom prst="rect">
             <a:avLst/>
@@ -6190,383 +6078,58 @@
               <a:buChar char="-"/>
             </a:pPr>
             <a:r>
-              <a:rPr lang="de-DE" dirty="0" err="1"/>
-              <a:t>ensures</a:t>
-            </a:r>
-            <a:r>
-              <a:rPr lang="de-DE" dirty="0"/>
-              <a:t> </a:t>
-            </a:r>
-            <a:r>
-              <a:rPr lang="de-DE" dirty="0" err="1"/>
-              <a:t>old</a:t>
-            </a:r>
-            <a:r>
-              <a:rPr lang="de-DE" dirty="0"/>
-              <a:t> (</a:t>
-            </a:r>
-            <a:r>
-              <a:rPr lang="de-DE" dirty="0" err="1"/>
-              <a:t>que</a:t>
-            </a:r>
-            <a:r>
-              <a:rPr lang="de-DE" dirty="0"/>
-              <a:t>[0].</a:t>
-            </a:r>
-            <a:r>
-              <a:rPr lang="de-DE" dirty="0" err="1"/>
-              <a:t>usedCPU</a:t>
-            </a:r>
-            <a:r>
-              <a:rPr lang="de-DE" dirty="0"/>
-              <a:t> + </a:t>
-            </a:r>
-            <a:r>
-              <a:rPr lang="de-DE" dirty="0" err="1"/>
-              <a:t>quantum</a:t>
-            </a:r>
-            <a:r>
-              <a:rPr lang="de-DE" dirty="0"/>
-              <a:t> &lt; </a:t>
-            </a:r>
-            <a:r>
-              <a:rPr lang="de-DE" dirty="0" err="1"/>
-              <a:t>que</a:t>
-            </a:r>
-            <a:r>
-              <a:rPr lang="de-DE" dirty="0"/>
-              <a:t>[0].</a:t>
-            </a:r>
-            <a:r>
-              <a:rPr lang="de-DE" dirty="0" err="1"/>
-              <a:t>duration</a:t>
-            </a:r>
-            <a:r>
-              <a:rPr lang="de-DE" dirty="0"/>
-              <a:t>) ==&gt; </a:t>
-            </a:r>
-          </a:p>
-          <a:p>
-            <a:r>
               <a:rPr lang="de-DE" dirty="0" smtClean="0"/>
-              <a:t>|</a:t>
-            </a:r>
-            <a:r>
-              <a:rPr lang="de-DE" dirty="0" err="1"/>
-              <a:t>que</a:t>
-            </a:r>
-            <a:r>
-              <a:rPr lang="de-DE" dirty="0"/>
-              <a:t>| == </a:t>
-            </a:r>
-            <a:r>
-              <a:rPr lang="de-DE" dirty="0" err="1"/>
-              <a:t>old</a:t>
-            </a:r>
-            <a:r>
-              <a:rPr lang="de-DE" dirty="0"/>
-              <a:t>(|</a:t>
-            </a:r>
-            <a:r>
-              <a:rPr lang="de-DE" dirty="0" err="1"/>
-              <a:t>que</a:t>
-            </a:r>
-            <a:r>
-              <a:rPr lang="de-DE" dirty="0"/>
-              <a:t>|) &amp;&amp; Valid() &amp;&amp; </a:t>
-            </a:r>
-            <a:endParaRPr lang="de-DE" dirty="0" smtClean="0"/>
-          </a:p>
-          <a:p>
-            <a:r>
-              <a:rPr lang="de-DE" dirty="0" err="1" smtClean="0"/>
-              <a:t>inQue</a:t>
-            </a:r>
-            <a:r>
-              <a:rPr lang="de-DE" dirty="0" smtClean="0"/>
-              <a:t>(</a:t>
-            </a:r>
-            <a:r>
-              <a:rPr lang="de-DE" dirty="0" err="1" smtClean="0"/>
-              <a:t>old</a:t>
-            </a:r>
-            <a:r>
-              <a:rPr lang="de-DE" dirty="0" smtClean="0"/>
-              <a:t>(</a:t>
-            </a:r>
-            <a:r>
-              <a:rPr lang="de-DE" dirty="0" err="1" smtClean="0"/>
-              <a:t>que</a:t>
-            </a:r>
-            <a:r>
-              <a:rPr lang="de-DE" dirty="0" smtClean="0"/>
-              <a:t>[0</a:t>
-            </a:r>
-            <a:r>
-              <a:rPr lang="de-DE" dirty="0"/>
-              <a:t>].</a:t>
-            </a:r>
-            <a:r>
-              <a:rPr lang="de-DE" dirty="0" err="1"/>
-              <a:t>getPid</a:t>
-            </a:r>
-            <a:r>
-              <a:rPr lang="de-DE" dirty="0"/>
-              <a:t>()))&amp;&amp; </a:t>
-            </a:r>
-            <a:r>
-              <a:rPr lang="de-DE" dirty="0" err="1"/>
-              <a:t>exists</a:t>
-            </a:r>
-            <a:r>
-              <a:rPr lang="de-DE" dirty="0"/>
-              <a:t> </a:t>
-            </a:r>
-            <a:r>
-              <a:rPr lang="de-DE" dirty="0" err="1"/>
-              <a:t>pcb</a:t>
-            </a:r>
-            <a:r>
-              <a:rPr lang="de-DE" dirty="0"/>
-              <a:t>: </a:t>
-            </a:r>
-            <a:r>
-              <a:rPr lang="de-DE" dirty="0" err="1"/>
-              <a:t>PCB_t</a:t>
-            </a:r>
-            <a:r>
-              <a:rPr lang="de-DE" dirty="0"/>
-              <a:t>:: (</a:t>
-            </a:r>
-            <a:r>
-              <a:rPr lang="de-DE" dirty="0" err="1"/>
-              <a:t>pcb</a:t>
-            </a:r>
-            <a:r>
-              <a:rPr lang="de-DE" dirty="0"/>
-              <a:t> != null &amp;&amp; </a:t>
-            </a:r>
-            <a:r>
-              <a:rPr lang="de-DE" dirty="0" err="1"/>
-              <a:t>pcb</a:t>
-            </a:r>
-            <a:r>
-              <a:rPr lang="de-DE" dirty="0"/>
-              <a:t>==</a:t>
-            </a:r>
-            <a:r>
-              <a:rPr lang="de-DE" dirty="0" err="1"/>
-              <a:t>old</a:t>
-            </a:r>
-            <a:r>
-              <a:rPr lang="de-DE" dirty="0"/>
-              <a:t>(</a:t>
-            </a:r>
-            <a:r>
-              <a:rPr lang="de-DE" dirty="0" err="1"/>
-              <a:t>que</a:t>
-            </a:r>
-            <a:r>
-              <a:rPr lang="de-DE" dirty="0"/>
-              <a:t>[0]) &amp;&amp; </a:t>
-            </a:r>
-            <a:r>
-              <a:rPr lang="de-DE" dirty="0" err="1"/>
-              <a:t>que</a:t>
-            </a:r>
-            <a:r>
-              <a:rPr lang="de-DE" dirty="0"/>
-              <a:t>==</a:t>
-            </a:r>
-            <a:r>
-              <a:rPr lang="de-DE" dirty="0" err="1"/>
-              <a:t>old</a:t>
-            </a:r>
-            <a:r>
-              <a:rPr lang="de-DE" dirty="0"/>
-              <a:t>(</a:t>
-            </a:r>
-            <a:r>
-              <a:rPr lang="de-DE" dirty="0" err="1"/>
-              <a:t>que</a:t>
-            </a:r>
-            <a:r>
-              <a:rPr lang="de-DE" dirty="0"/>
-              <a:t>[1..]+[</a:t>
-            </a:r>
-            <a:r>
-              <a:rPr lang="de-DE" dirty="0" err="1"/>
-              <a:t>pcb</a:t>
-            </a:r>
-            <a:r>
-              <a:rPr lang="de-DE" dirty="0" smtClean="0"/>
-              <a:t>]));</a:t>
-            </a:r>
-          </a:p>
-          <a:p>
-            <a:endParaRPr lang="de-DE" dirty="0"/>
+              <a:t>Veränderung an der Länge der Queue </a:t>
+            </a:r>
           </a:p>
           <a:p>
             <a:pPr marL="285750" indent="-285750">
               <a:buFontTx/>
               <a:buChar char="-"/>
             </a:pPr>
-            <a:r>
-              <a:rPr lang="de-DE" dirty="0" err="1" smtClean="0"/>
-              <a:t>ensures</a:t>
-            </a:r>
+            <a:endParaRPr lang="de-DE" dirty="0" smtClean="0"/>
+          </a:p>
+          <a:p>
+            <a:pPr marL="285750" indent="-285750">
+              <a:buFontTx/>
+              <a:buChar char="-"/>
+            </a:pPr>
             <a:r>
               <a:rPr lang="de-DE" dirty="0" smtClean="0"/>
+              <a:t>Abarbeitung von PCB</a:t>
+            </a:r>
+          </a:p>
+          <a:p>
+            <a:pPr marL="285750" indent="-285750">
+              <a:buFontTx/>
+              <a:buChar char="-"/>
+            </a:pPr>
+            <a:endParaRPr lang="de-DE" dirty="0" smtClean="0"/>
+          </a:p>
+          <a:p>
+            <a:pPr marL="285750" indent="-285750">
+              <a:buFontTx/>
+              <a:buChar char="-"/>
+            </a:pPr>
+            <a:r>
+              <a:rPr lang="de-DE" dirty="0" err="1"/>
+              <a:t>modifies</a:t>
+            </a:r>
+            <a:r>
+              <a:rPr lang="de-DE" dirty="0"/>
               <a:t> </a:t>
             </a:r>
             <a:r>
               <a:rPr lang="de-DE" dirty="0" err="1"/>
-              <a:t>old</a:t>
-            </a:r>
-            <a:r>
-              <a:rPr lang="de-DE" dirty="0"/>
-              <a:t> (</a:t>
-            </a:r>
-            <a:r>
-              <a:rPr lang="de-DE" dirty="0" err="1"/>
-              <a:t>que</a:t>
-            </a:r>
-            <a:r>
-              <a:rPr lang="de-DE" dirty="0"/>
-              <a:t>[0].</a:t>
-            </a:r>
-            <a:r>
-              <a:rPr lang="de-DE" dirty="0" err="1"/>
-              <a:t>usedCPU</a:t>
-            </a:r>
-            <a:r>
-              <a:rPr lang="de-DE" dirty="0"/>
-              <a:t> + </a:t>
-            </a:r>
-            <a:r>
-              <a:rPr lang="de-DE" dirty="0" err="1"/>
-              <a:t>quantum</a:t>
-            </a:r>
-            <a:r>
-              <a:rPr lang="de-DE" dirty="0"/>
-              <a:t> &gt;= </a:t>
-            </a:r>
-            <a:r>
-              <a:rPr lang="de-DE" dirty="0" err="1"/>
-              <a:t>que</a:t>
-            </a:r>
-            <a:r>
-              <a:rPr lang="de-DE" dirty="0"/>
-              <a:t>[0].</a:t>
-            </a:r>
-            <a:r>
-              <a:rPr lang="de-DE" dirty="0" err="1"/>
-              <a:t>duration</a:t>
-            </a:r>
-            <a:r>
-              <a:rPr lang="de-DE" dirty="0"/>
-              <a:t>) ==&gt; </a:t>
-            </a:r>
-          </a:p>
-          <a:p>
-            <a:r>
-              <a:rPr lang="de-DE" dirty="0" smtClean="0"/>
-              <a:t>|</a:t>
-            </a:r>
-            <a:r>
-              <a:rPr lang="de-DE" dirty="0" err="1"/>
-              <a:t>que</a:t>
-            </a:r>
-            <a:r>
-              <a:rPr lang="de-DE" dirty="0"/>
-              <a:t>|+1 == </a:t>
-            </a:r>
-            <a:r>
-              <a:rPr lang="de-DE" dirty="0" err="1"/>
-              <a:t>old</a:t>
-            </a:r>
-            <a:r>
-              <a:rPr lang="de-DE" dirty="0"/>
-              <a:t>(|</a:t>
-            </a:r>
-            <a:r>
-              <a:rPr lang="de-DE" dirty="0" err="1"/>
-              <a:t>que</a:t>
-            </a:r>
-            <a:r>
-              <a:rPr lang="de-DE" dirty="0"/>
-              <a:t>|) &amp;&amp; Valid() </a:t>
-            </a:r>
-            <a:r>
-              <a:rPr lang="de-DE" dirty="0" smtClean="0"/>
-              <a:t>&amp;&amp;</a:t>
-            </a:r>
-          </a:p>
-          <a:p>
-            <a:r>
-              <a:rPr lang="de-DE" dirty="0" smtClean="0"/>
-              <a:t> </a:t>
-            </a:r>
-            <a:r>
-              <a:rPr lang="de-DE" dirty="0"/>
-              <a:t>!</a:t>
-            </a:r>
-            <a:r>
-              <a:rPr lang="de-DE" dirty="0" err="1"/>
-              <a:t>inQue</a:t>
-            </a:r>
-            <a:r>
-              <a:rPr lang="de-DE" dirty="0"/>
-              <a:t>(</a:t>
-            </a:r>
-            <a:r>
-              <a:rPr lang="de-DE" dirty="0" err="1"/>
-              <a:t>old</a:t>
-            </a:r>
-            <a:r>
-              <a:rPr lang="de-DE" dirty="0"/>
-              <a:t>(</a:t>
-            </a:r>
-            <a:r>
-              <a:rPr lang="de-DE" dirty="0" err="1"/>
-              <a:t>que</a:t>
-            </a:r>
-            <a:r>
-              <a:rPr lang="de-DE" dirty="0"/>
-              <a:t>[0].</a:t>
-            </a:r>
-            <a:r>
-              <a:rPr lang="de-DE" dirty="0" err="1"/>
-              <a:t>getPid</a:t>
-            </a:r>
-            <a:r>
-              <a:rPr lang="de-DE" dirty="0"/>
-              <a:t>()))&amp;&amp; </a:t>
-            </a:r>
-            <a:r>
-              <a:rPr lang="de-DE" dirty="0" err="1"/>
-              <a:t>que</a:t>
-            </a:r>
-            <a:r>
-              <a:rPr lang="de-DE" dirty="0"/>
-              <a:t>==</a:t>
-            </a:r>
-            <a:r>
-              <a:rPr lang="de-DE" dirty="0" err="1"/>
-              <a:t>old</a:t>
-            </a:r>
-            <a:r>
-              <a:rPr lang="de-DE" dirty="0"/>
-              <a:t>(</a:t>
-            </a:r>
-            <a:r>
-              <a:rPr lang="de-DE" dirty="0" err="1"/>
-              <a:t>que</a:t>
-            </a:r>
-            <a:r>
-              <a:rPr lang="de-DE" dirty="0"/>
-              <a:t>[1..]);</a:t>
-            </a:r>
+              <a:t>clause</a:t>
+            </a:r>
+            <a:endParaRPr lang="de-DE" dirty="0"/>
+          </a:p>
+          <a:p>
+            <a:pPr marL="285750" indent="-285750">
+              <a:buFontTx/>
+              <a:buChar char="-"/>
+            </a:pPr>
             <a:endParaRPr lang="de-DE" dirty="0" smtClean="0"/>
           </a:p>
         </p:txBody>
@@ -6574,7 +6137,7 @@
     </p:spTree>
     <p:extLst>
       <p:ext uri="{BB962C8B-B14F-4D97-AF65-F5344CB8AC3E}">
-        <p14:creationId xmlns:p14="http://schemas.microsoft.com/office/powerpoint/2010/main" val="186064819"/>
+        <p14:creationId xmlns:p14="http://schemas.microsoft.com/office/powerpoint/2010/main" val="31747628"/>
       </p:ext>
     </p:extLst>
   </p:cSld>
@@ -6869,10 +6432,449 @@
           </a:p>
         </p:txBody>
       </p:sp>
+      <p:sp>
+        <p:nvSpPr>
+          <p:cNvPr id="11" name="Textfeld 10"/>
+          <p:cNvSpPr txBox="1"/>
+          <p:nvPr/>
+        </p:nvSpPr>
+        <p:spPr>
+          <a:xfrm>
+            <a:off x="1207378" y="1503110"/>
+            <a:ext cx="7674964" cy="523220"/>
+          </a:xfrm>
+          <a:prstGeom prst="rect">
+            <a:avLst/>
+          </a:prstGeom>
+          <a:noFill/>
+        </p:spPr>
+        <p:txBody>
+          <a:bodyPr wrap="square" rtlCol="0">
+            <a:spAutoFit/>
+          </a:bodyPr>
+          <a:lstStyle/>
+          <a:p>
+            <a:pPr algn="ctr"/>
+            <a:r>
+              <a:rPr lang="de-DE" sz="2800" dirty="0" smtClean="0"/>
+              <a:t>Schwierigkeiten</a:t>
+            </a:r>
+            <a:endParaRPr lang="de-DE" sz="2800" dirty="0"/>
+          </a:p>
+        </p:txBody>
+      </p:sp>
+      <p:sp>
+        <p:nvSpPr>
+          <p:cNvPr id="12" name="Textfeld 11"/>
+          <p:cNvSpPr txBox="1"/>
+          <p:nvPr/>
+        </p:nvSpPr>
+        <p:spPr>
+          <a:xfrm>
+            <a:off x="1207378" y="2900075"/>
+            <a:ext cx="7950910" cy="2308324"/>
+          </a:xfrm>
+          <a:prstGeom prst="rect">
+            <a:avLst/>
+          </a:prstGeom>
+          <a:noFill/>
+        </p:spPr>
+        <p:txBody>
+          <a:bodyPr wrap="square" rtlCol="0">
+            <a:spAutoFit/>
+          </a:bodyPr>
+          <a:lstStyle/>
+          <a:p>
+            <a:pPr marL="285750" indent="-285750">
+              <a:buFontTx/>
+              <a:buChar char="-"/>
+            </a:pPr>
+            <a:r>
+              <a:rPr lang="de-DE" dirty="0" err="1"/>
+              <a:t>ensures</a:t>
+            </a:r>
+            <a:r>
+              <a:rPr lang="de-DE" dirty="0"/>
+              <a:t> </a:t>
+            </a:r>
+            <a:r>
+              <a:rPr lang="de-DE" dirty="0" err="1"/>
+              <a:t>old</a:t>
+            </a:r>
+            <a:r>
+              <a:rPr lang="de-DE" dirty="0"/>
+              <a:t> (</a:t>
+            </a:r>
+            <a:r>
+              <a:rPr lang="de-DE" dirty="0" err="1"/>
+              <a:t>que</a:t>
+            </a:r>
+            <a:r>
+              <a:rPr lang="de-DE" dirty="0"/>
+              <a:t>[0].</a:t>
+            </a:r>
+            <a:r>
+              <a:rPr lang="de-DE" dirty="0" err="1"/>
+              <a:t>usedCPU</a:t>
+            </a:r>
+            <a:r>
+              <a:rPr lang="de-DE" dirty="0"/>
+              <a:t> + </a:t>
+            </a:r>
+            <a:r>
+              <a:rPr lang="de-DE" dirty="0" err="1"/>
+              <a:t>quantum</a:t>
+            </a:r>
+            <a:r>
+              <a:rPr lang="de-DE" dirty="0"/>
+              <a:t> &lt; </a:t>
+            </a:r>
+            <a:r>
+              <a:rPr lang="de-DE" dirty="0" err="1"/>
+              <a:t>que</a:t>
+            </a:r>
+            <a:r>
+              <a:rPr lang="de-DE" dirty="0"/>
+              <a:t>[0].</a:t>
+            </a:r>
+            <a:r>
+              <a:rPr lang="de-DE" dirty="0" err="1"/>
+              <a:t>duration</a:t>
+            </a:r>
+            <a:r>
+              <a:rPr lang="de-DE" dirty="0"/>
+              <a:t>) ==&gt; </a:t>
+            </a:r>
+          </a:p>
+          <a:p>
+            <a:r>
+              <a:rPr lang="de-DE" dirty="0" smtClean="0"/>
+              <a:t>|</a:t>
+            </a:r>
+            <a:r>
+              <a:rPr lang="de-DE" dirty="0" err="1"/>
+              <a:t>que</a:t>
+            </a:r>
+            <a:r>
+              <a:rPr lang="de-DE" dirty="0"/>
+              <a:t>| == </a:t>
+            </a:r>
+            <a:r>
+              <a:rPr lang="de-DE" dirty="0" err="1"/>
+              <a:t>old</a:t>
+            </a:r>
+            <a:r>
+              <a:rPr lang="de-DE" dirty="0"/>
+              <a:t>(|</a:t>
+            </a:r>
+            <a:r>
+              <a:rPr lang="de-DE" dirty="0" err="1"/>
+              <a:t>que</a:t>
+            </a:r>
+            <a:r>
+              <a:rPr lang="de-DE" dirty="0"/>
+              <a:t>|) &amp;&amp; Valid() &amp;&amp; </a:t>
+            </a:r>
+            <a:endParaRPr lang="de-DE" dirty="0" smtClean="0"/>
+          </a:p>
+          <a:p>
+            <a:r>
+              <a:rPr lang="de-DE" dirty="0" err="1" smtClean="0"/>
+              <a:t>inQue</a:t>
+            </a:r>
+            <a:r>
+              <a:rPr lang="de-DE" dirty="0" smtClean="0"/>
+              <a:t>(</a:t>
+            </a:r>
+            <a:r>
+              <a:rPr lang="de-DE" dirty="0" err="1" smtClean="0"/>
+              <a:t>old</a:t>
+            </a:r>
+            <a:r>
+              <a:rPr lang="de-DE" dirty="0" smtClean="0"/>
+              <a:t>(</a:t>
+            </a:r>
+            <a:r>
+              <a:rPr lang="de-DE" dirty="0" err="1" smtClean="0"/>
+              <a:t>que</a:t>
+            </a:r>
+            <a:r>
+              <a:rPr lang="de-DE" dirty="0" smtClean="0"/>
+              <a:t>[0</a:t>
+            </a:r>
+            <a:r>
+              <a:rPr lang="de-DE" dirty="0"/>
+              <a:t>].</a:t>
+            </a:r>
+            <a:r>
+              <a:rPr lang="de-DE" dirty="0" err="1"/>
+              <a:t>getPid</a:t>
+            </a:r>
+            <a:r>
+              <a:rPr lang="de-DE" dirty="0"/>
+              <a:t>()))&amp;&amp; </a:t>
+            </a:r>
+            <a:r>
+              <a:rPr lang="de-DE" dirty="0" err="1"/>
+              <a:t>exists</a:t>
+            </a:r>
+            <a:r>
+              <a:rPr lang="de-DE" dirty="0"/>
+              <a:t> </a:t>
+            </a:r>
+            <a:r>
+              <a:rPr lang="de-DE" dirty="0" err="1"/>
+              <a:t>pcb</a:t>
+            </a:r>
+            <a:r>
+              <a:rPr lang="de-DE" dirty="0"/>
+              <a:t>: </a:t>
+            </a:r>
+            <a:r>
+              <a:rPr lang="de-DE" dirty="0" err="1"/>
+              <a:t>PCB_t</a:t>
+            </a:r>
+            <a:r>
+              <a:rPr lang="de-DE" dirty="0"/>
+              <a:t>:: (</a:t>
+            </a:r>
+            <a:r>
+              <a:rPr lang="de-DE" dirty="0" err="1"/>
+              <a:t>pcb</a:t>
+            </a:r>
+            <a:r>
+              <a:rPr lang="de-DE" dirty="0"/>
+              <a:t> != null &amp;&amp; </a:t>
+            </a:r>
+            <a:r>
+              <a:rPr lang="de-DE" dirty="0" err="1"/>
+              <a:t>pcb</a:t>
+            </a:r>
+            <a:r>
+              <a:rPr lang="de-DE" dirty="0"/>
+              <a:t>==</a:t>
+            </a:r>
+            <a:r>
+              <a:rPr lang="de-DE" dirty="0" err="1"/>
+              <a:t>old</a:t>
+            </a:r>
+            <a:r>
+              <a:rPr lang="de-DE" dirty="0"/>
+              <a:t>(</a:t>
+            </a:r>
+            <a:r>
+              <a:rPr lang="de-DE" dirty="0" err="1"/>
+              <a:t>que</a:t>
+            </a:r>
+            <a:r>
+              <a:rPr lang="de-DE" dirty="0"/>
+              <a:t>[0]) &amp;&amp; </a:t>
+            </a:r>
+            <a:r>
+              <a:rPr lang="de-DE" dirty="0" err="1"/>
+              <a:t>que</a:t>
+            </a:r>
+            <a:r>
+              <a:rPr lang="de-DE" dirty="0"/>
+              <a:t>==</a:t>
+            </a:r>
+            <a:r>
+              <a:rPr lang="de-DE" dirty="0" err="1"/>
+              <a:t>old</a:t>
+            </a:r>
+            <a:r>
+              <a:rPr lang="de-DE" dirty="0"/>
+              <a:t>(</a:t>
+            </a:r>
+            <a:r>
+              <a:rPr lang="de-DE" dirty="0" err="1"/>
+              <a:t>que</a:t>
+            </a:r>
+            <a:r>
+              <a:rPr lang="de-DE" dirty="0"/>
+              <a:t>[1..]+[</a:t>
+            </a:r>
+            <a:r>
+              <a:rPr lang="de-DE" dirty="0" err="1"/>
+              <a:t>pcb</a:t>
+            </a:r>
+            <a:r>
+              <a:rPr lang="de-DE" dirty="0" smtClean="0"/>
+              <a:t>]));</a:t>
+            </a:r>
+          </a:p>
+          <a:p>
+            <a:endParaRPr lang="de-DE" dirty="0"/>
+          </a:p>
+          <a:p>
+            <a:pPr marL="285750" indent="-285750">
+              <a:buFontTx/>
+              <a:buChar char="-"/>
+            </a:pPr>
+            <a:r>
+              <a:rPr lang="de-DE" dirty="0" err="1" smtClean="0"/>
+              <a:t>ensures</a:t>
+            </a:r>
+            <a:r>
+              <a:rPr lang="de-DE" dirty="0" smtClean="0"/>
+              <a:t> </a:t>
+            </a:r>
+            <a:r>
+              <a:rPr lang="de-DE" dirty="0" err="1"/>
+              <a:t>old</a:t>
+            </a:r>
+            <a:r>
+              <a:rPr lang="de-DE" dirty="0"/>
+              <a:t> (</a:t>
+            </a:r>
+            <a:r>
+              <a:rPr lang="de-DE" dirty="0" err="1"/>
+              <a:t>que</a:t>
+            </a:r>
+            <a:r>
+              <a:rPr lang="de-DE" dirty="0"/>
+              <a:t>[0].</a:t>
+            </a:r>
+            <a:r>
+              <a:rPr lang="de-DE" dirty="0" err="1"/>
+              <a:t>usedCPU</a:t>
+            </a:r>
+            <a:r>
+              <a:rPr lang="de-DE" dirty="0"/>
+              <a:t> + </a:t>
+            </a:r>
+            <a:r>
+              <a:rPr lang="de-DE" dirty="0" err="1"/>
+              <a:t>quantum</a:t>
+            </a:r>
+            <a:r>
+              <a:rPr lang="de-DE" dirty="0"/>
+              <a:t> &gt;= </a:t>
+            </a:r>
+            <a:r>
+              <a:rPr lang="de-DE" dirty="0" err="1"/>
+              <a:t>que</a:t>
+            </a:r>
+            <a:r>
+              <a:rPr lang="de-DE" dirty="0"/>
+              <a:t>[0].</a:t>
+            </a:r>
+            <a:r>
+              <a:rPr lang="de-DE" dirty="0" err="1"/>
+              <a:t>duration</a:t>
+            </a:r>
+            <a:r>
+              <a:rPr lang="de-DE" dirty="0"/>
+              <a:t>) ==&gt; </a:t>
+            </a:r>
+          </a:p>
+          <a:p>
+            <a:r>
+              <a:rPr lang="de-DE" dirty="0" smtClean="0"/>
+              <a:t>|</a:t>
+            </a:r>
+            <a:r>
+              <a:rPr lang="de-DE" dirty="0" err="1"/>
+              <a:t>que</a:t>
+            </a:r>
+            <a:r>
+              <a:rPr lang="de-DE" dirty="0"/>
+              <a:t>|+1 == </a:t>
+            </a:r>
+            <a:r>
+              <a:rPr lang="de-DE" dirty="0" err="1"/>
+              <a:t>old</a:t>
+            </a:r>
+            <a:r>
+              <a:rPr lang="de-DE" dirty="0"/>
+              <a:t>(|</a:t>
+            </a:r>
+            <a:r>
+              <a:rPr lang="de-DE" dirty="0" err="1"/>
+              <a:t>que</a:t>
+            </a:r>
+            <a:r>
+              <a:rPr lang="de-DE" dirty="0"/>
+              <a:t>|) &amp;&amp; Valid() </a:t>
+            </a:r>
+            <a:r>
+              <a:rPr lang="de-DE" dirty="0" smtClean="0"/>
+              <a:t>&amp;&amp;</a:t>
+            </a:r>
+          </a:p>
+          <a:p>
+            <a:r>
+              <a:rPr lang="de-DE" dirty="0" smtClean="0"/>
+              <a:t> </a:t>
+            </a:r>
+            <a:r>
+              <a:rPr lang="de-DE" dirty="0"/>
+              <a:t>!</a:t>
+            </a:r>
+            <a:r>
+              <a:rPr lang="de-DE" dirty="0" err="1"/>
+              <a:t>inQue</a:t>
+            </a:r>
+            <a:r>
+              <a:rPr lang="de-DE" dirty="0"/>
+              <a:t>(</a:t>
+            </a:r>
+            <a:r>
+              <a:rPr lang="de-DE" dirty="0" err="1"/>
+              <a:t>old</a:t>
+            </a:r>
+            <a:r>
+              <a:rPr lang="de-DE" dirty="0"/>
+              <a:t>(</a:t>
+            </a:r>
+            <a:r>
+              <a:rPr lang="de-DE" dirty="0" err="1"/>
+              <a:t>que</a:t>
+            </a:r>
+            <a:r>
+              <a:rPr lang="de-DE" dirty="0"/>
+              <a:t>[0].</a:t>
+            </a:r>
+            <a:r>
+              <a:rPr lang="de-DE" dirty="0" err="1"/>
+              <a:t>getPid</a:t>
+            </a:r>
+            <a:r>
+              <a:rPr lang="de-DE" dirty="0"/>
+              <a:t>()))&amp;&amp; </a:t>
+            </a:r>
+            <a:r>
+              <a:rPr lang="de-DE" dirty="0" err="1"/>
+              <a:t>que</a:t>
+            </a:r>
+            <a:r>
+              <a:rPr lang="de-DE" dirty="0"/>
+              <a:t>==</a:t>
+            </a:r>
+            <a:r>
+              <a:rPr lang="de-DE" dirty="0" err="1"/>
+              <a:t>old</a:t>
+            </a:r>
+            <a:r>
+              <a:rPr lang="de-DE" dirty="0"/>
+              <a:t>(</a:t>
+            </a:r>
+            <a:r>
+              <a:rPr lang="de-DE" dirty="0" err="1"/>
+              <a:t>que</a:t>
+            </a:r>
+            <a:r>
+              <a:rPr lang="de-DE" dirty="0"/>
+              <a:t>[1..]);</a:t>
+            </a:r>
+            <a:endParaRPr lang="de-DE" dirty="0" smtClean="0"/>
+          </a:p>
+        </p:txBody>
+      </p:sp>
     </p:spTree>
     <p:extLst>
       <p:ext uri="{BB962C8B-B14F-4D97-AF65-F5344CB8AC3E}">
-        <p14:creationId xmlns:p14="http://schemas.microsoft.com/office/powerpoint/2010/main" val="224992256"/>
+        <p14:creationId xmlns:p14="http://schemas.microsoft.com/office/powerpoint/2010/main" val="186064819"/>
       </p:ext>
     </p:extLst>
   </p:cSld>
@@ -7201,304 +7203,6 @@
     <p:extLst>
       <p:ext uri="{BB962C8B-B14F-4D97-AF65-F5344CB8AC3E}">
         <p14:creationId xmlns:p14="http://schemas.microsoft.com/office/powerpoint/2010/main" val="1371026154"/>
-      </p:ext>
-    </p:extLst>
-  </p:cSld>
-  <p:clrMapOvr>
-    <a:masterClrMapping/>
-  </p:clrMapOvr>
-  <mc:AlternateContent xmlns:mc="http://schemas.openxmlformats.org/markup-compatibility/2006" xmlns:p14="http://schemas.microsoft.com/office/powerpoint/2010/main">
-    <mc:Choice Requires="p14">
-      <p:transition spd="slow" p14:dur="2000"/>
-    </mc:Choice>
-    <mc:Fallback xmlns="">
-      <p:transition spd="slow"/>
-    </mc:Fallback>
-  </mc:AlternateContent>
-  <p:timing>
-    <p:tnLst>
-      <p:par>
-        <p:cTn id="1" dur="indefinite" restart="never" nodeType="tmRoot"/>
-      </p:par>
-    </p:tnLst>
-  </p:timing>
-</p:sld>
-</file>
-
-<file path=ppt/slides/slide7.xml><?xml version="1.0" encoding="utf-8"?>
-<p:sld xmlns:a="http://schemas.openxmlformats.org/drawingml/2006/main" xmlns:r="http://schemas.openxmlformats.org/officeDocument/2006/relationships" xmlns:p="http://schemas.openxmlformats.org/presentationml/2006/main">
-  <p:cSld>
-    <p:spTree>
-      <p:nvGrpSpPr>
-        <p:cNvPr id="1" name=""/>
-        <p:cNvGrpSpPr/>
-        <p:nvPr/>
-      </p:nvGrpSpPr>
-      <p:grpSpPr>
-        <a:xfrm>
-          <a:off x="0" y="0"/>
-          <a:ext cx="0" cy="0"/>
-          <a:chOff x="0" y="0"/>
-          <a:chExt cx="0" cy="0"/>
-        </a:xfrm>
-      </p:grpSpPr>
-      <p:pic>
-        <p:nvPicPr>
-          <p:cNvPr id="10" name="Grafik 9"/>
-          <p:cNvPicPr>
-            <a:picLocks noChangeAspect="1"/>
-          </p:cNvPicPr>
-          <p:nvPr/>
-        </p:nvPicPr>
-        <p:blipFill>
-          <a:blip r:embed="rId3">
-            <a:extLst>
-              <a:ext uri="{28A0092B-C50C-407E-A947-70E740481C1C}">
-                <a14:useLocalDpi xmlns:a14="http://schemas.microsoft.com/office/drawing/2010/main" val="0"/>
-              </a:ext>
-            </a:extLst>
-          </a:blip>
-          <a:stretch>
-            <a:fillRect/>
-          </a:stretch>
-        </p:blipFill>
-        <p:spPr>
-          <a:xfrm>
-            <a:off x="7510072" y="72000"/>
-            <a:ext cx="2391615" cy="1214789"/>
-          </a:xfrm>
-          <a:prstGeom prst="rect">
-            <a:avLst/>
-          </a:prstGeom>
-        </p:spPr>
-      </p:pic>
-      <p:sp>
-        <p:nvSpPr>
-          <p:cNvPr id="7" name="Datumsplatzhalter 1"/>
-          <p:cNvSpPr>
-            <a:spLocks noGrp="1"/>
-          </p:cNvSpPr>
-          <p:nvPr>
-            <p:ph type="dt" sz="half" idx="10"/>
-          </p:nvPr>
-        </p:nvSpPr>
-        <p:spPr/>
-        <p:txBody>
-          <a:bodyPr/>
-          <a:lstStyle/>
-          <a:p>
-            <a:pPr lvl="0"/>
-            <a:fld id="{73EB4CEC-1371-4CB6-8F44-5A689661CE91}" type="datetimeFigureOut">
-              <a:t>08.11.2015</a:t>
-            </a:fld>
-            <a:endParaRPr lang="x-none"/>
-          </a:p>
-        </p:txBody>
-      </p:sp>
-      <p:sp>
-        <p:nvSpPr>
-          <p:cNvPr id="8" name="Fußzeilenplatzhalter 2"/>
-          <p:cNvSpPr>
-            <a:spLocks noGrp="1"/>
-          </p:cNvSpPr>
-          <p:nvPr>
-            <p:ph type="ftr" sz="quarter" idx="11"/>
-          </p:nvPr>
-        </p:nvSpPr>
-        <p:spPr/>
-        <p:txBody>
-          <a:bodyPr/>
-          <a:lstStyle/>
-          <a:p>
-            <a:pPr lvl="0"/>
-            <a:r>
-              <a:rPr lang="x-none" smtClean="0"/>
-              <a:t>Kai Köster und Erik Svenonius</a:t>
-            </a:r>
-            <a:endParaRPr lang="x-none"/>
-          </a:p>
-        </p:txBody>
-      </p:sp>
-      <p:sp>
-        <p:nvSpPr>
-          <p:cNvPr id="9" name="Foliennummernplatzhalter 3"/>
-          <p:cNvSpPr>
-            <a:spLocks noGrp="1"/>
-          </p:cNvSpPr>
-          <p:nvPr>
-            <p:ph type="sldNum" sz="quarter" idx="12"/>
-          </p:nvPr>
-        </p:nvSpPr>
-        <p:spPr/>
-        <p:txBody>
-          <a:bodyPr/>
-          <a:lstStyle/>
-          <a:p>
-            <a:pPr lvl="0"/>
-            <a:fld id="{74D86CA0-BD5C-4A7E-8D6D-C071106A5058}" type="slidenum">
-              <a:t>7</a:t>
-            </a:fld>
-            <a:endParaRPr lang="x-none"/>
-          </a:p>
-        </p:txBody>
-      </p:sp>
-      <p:sp>
-        <p:nvSpPr>
-          <p:cNvPr id="3" name="Gerader Verbinder 2"/>
-          <p:cNvSpPr/>
-          <p:nvPr/>
-        </p:nvSpPr>
-        <p:spPr>
-          <a:xfrm>
-            <a:off x="-180000" y="1044000"/>
-            <a:ext cx="10800000" cy="0"/>
-          </a:xfrm>
-          <a:prstGeom prst="line">
-            <a:avLst/>
-          </a:prstGeom>
-          <a:noFill/>
-          <a:ln w="0">
-            <a:solidFill>
-              <a:srgbClr val="000000"/>
-            </a:solidFill>
-            <a:prstDash val="solid"/>
-          </a:ln>
-        </p:spPr>
-        <p:txBody>
-          <a:bodyPr vert="horz" wrap="none" lIns="90000" tIns="45000" rIns="90000" bIns="45000" anchor="ctr" anchorCtr="1" compatLnSpc="0"/>
-          <a:lstStyle/>
-          <a:p>
-            <a:pPr marL="0" marR="0" lvl="0" indent="0" rtl="0" hangingPunct="0">
-              <a:lnSpc>
-                <a:spcPct val="100000"/>
-              </a:lnSpc>
-              <a:spcBef>
-                <a:spcPts val="0"/>
-              </a:spcBef>
-              <a:spcAft>
-                <a:spcPts val="0"/>
-              </a:spcAft>
-              <a:buNone/>
-              <a:tabLst/>
-            </a:pPr>
-            <a:endParaRPr lang="de-DE" sz="1800" b="0" i="0" u="none" strike="noStrike" kern="1200">
-              <a:ln>
-                <a:noFill/>
-              </a:ln>
-              <a:latin typeface="Arial" pitchFamily="18"/>
-              <a:ea typeface="Andale Sans UI" pitchFamily="2"/>
-              <a:cs typeface="Tahoma" pitchFamily="2"/>
-            </a:endParaRPr>
-          </a:p>
-        </p:txBody>
-      </p:sp>
-      <p:sp>
-        <p:nvSpPr>
-          <p:cNvPr id="4" name="Textfeld 3"/>
-          <p:cNvSpPr txBox="1"/>
-          <p:nvPr/>
-        </p:nvSpPr>
-        <p:spPr>
-          <a:xfrm>
-            <a:off x="469440" y="360000"/>
-            <a:ext cx="2230560" cy="432720"/>
-          </a:xfrm>
-          <a:prstGeom prst="rect">
-            <a:avLst/>
-          </a:prstGeom>
-          <a:noFill/>
-          <a:ln>
-            <a:noFill/>
-          </a:ln>
-        </p:spPr>
-        <p:txBody>
-          <a:bodyPr vert="horz" wrap="none" lIns="90000" tIns="45000" rIns="90000" bIns="45000" compatLnSpc="0">
-            <a:spAutoFit/>
-          </a:bodyPr>
-          <a:lstStyle/>
-          <a:p>
-            <a:pPr marL="0" marR="0" lvl="0" indent="0" rtl="0" hangingPunct="0">
-              <a:lnSpc>
-                <a:spcPct val="100000"/>
-              </a:lnSpc>
-              <a:spcBef>
-                <a:spcPts val="0"/>
-              </a:spcBef>
-              <a:spcAft>
-                <a:spcPts val="0"/>
-              </a:spcAft>
-              <a:buNone/>
-              <a:tabLst/>
-              <a:defRPr sz="1800"/>
-            </a:pPr>
-            <a:r>
-              <a:rPr lang="de-DE" sz="1800" b="0" i="0" u="none" strike="noStrike" kern="1200">
-                <a:ln>
-                  <a:noFill/>
-                </a:ln>
-                <a:latin typeface="Arial" pitchFamily="18"/>
-                <a:ea typeface="Andale Sans UI" pitchFamily="2"/>
-                <a:cs typeface="Tahoma" pitchFamily="2"/>
-              </a:rPr>
-              <a:t>Softwareverifikation</a:t>
-            </a:r>
-          </a:p>
-        </p:txBody>
-      </p:sp>
-      <p:sp>
-        <p:nvSpPr>
-          <p:cNvPr id="5" name="Gerader Verbinder 4"/>
-          <p:cNvSpPr/>
-          <p:nvPr/>
-        </p:nvSpPr>
-        <p:spPr>
-          <a:xfrm>
-            <a:off x="360000" y="72000"/>
-            <a:ext cx="0" cy="900000"/>
-          </a:xfrm>
-          <a:prstGeom prst="line">
-            <a:avLst/>
-          </a:prstGeom>
-          <a:noFill/>
-          <a:ln w="180000">
-            <a:solidFill>
-              <a:srgbClr val="FF3333"/>
-            </a:solidFill>
-            <a:prstDash val="solid"/>
-          </a:ln>
-        </p:spPr>
-        <p:txBody>
-          <a:bodyPr vert="horz" wrap="none" lIns="180000" tIns="135000" rIns="180000" bIns="135000" anchor="ctr" anchorCtr="1" compatLnSpc="0"/>
-          <a:lstStyle/>
-          <a:p>
-            <a:pPr marL="0" marR="0" lvl="0" indent="0" rtl="0" hangingPunct="0">
-              <a:lnSpc>
-                <a:spcPct val="100000"/>
-              </a:lnSpc>
-              <a:spcBef>
-                <a:spcPts val="0"/>
-              </a:spcBef>
-              <a:spcAft>
-                <a:spcPts val="0"/>
-              </a:spcAft>
-              <a:buNone/>
-              <a:tabLst/>
-            </a:pPr>
-            <a:endParaRPr lang="de-DE" sz="1800" b="0" i="0" u="none" strike="noStrike" kern="1200">
-              <a:ln>
-                <a:noFill/>
-              </a:ln>
-              <a:latin typeface="Arial" pitchFamily="18"/>
-              <a:ea typeface="Andale Sans UI" pitchFamily="2"/>
-              <a:cs typeface="Tahoma" pitchFamily="2"/>
-            </a:endParaRPr>
-          </a:p>
-        </p:txBody>
-      </p:sp>
-    </p:spTree>
-    <p:extLst>
-      <p:ext uri="{BB962C8B-B14F-4D97-AF65-F5344CB8AC3E}">
-        <p14:creationId xmlns:p14="http://schemas.microsoft.com/office/powerpoint/2010/main" val="3050347589"/>
       </p:ext>
     </p:extLst>
   </p:cSld>

</xml_diff>